<commit_message>
The Twenty Third Commit
Small visual fixes. Russian language everywhere.
</commit_message>
<xml_diff>
--- a/doc/SUNO Mmanager.pptx
+++ b/doc/SUNO Mmanager.pptx
@@ -11,6 +11,27 @@
     <p:sldId id="259" r:id="rId5"/>
     <p:sldId id="258" r:id="rId6"/>
     <p:sldId id="261" r:id="rId7"/>
+    <p:sldId id="262" r:id="rId8"/>
+    <p:sldId id="263" r:id="rId9"/>
+    <p:sldId id="264" r:id="rId10"/>
+    <p:sldId id="265" r:id="rId11"/>
+    <p:sldId id="266" r:id="rId12"/>
+    <p:sldId id="267" r:id="rId13"/>
+    <p:sldId id="268" r:id="rId14"/>
+    <p:sldId id="269" r:id="rId15"/>
+    <p:sldId id="270" r:id="rId16"/>
+    <p:sldId id="271" r:id="rId17"/>
+    <p:sldId id="272" r:id="rId18"/>
+    <p:sldId id="273" r:id="rId19"/>
+    <p:sldId id="274" r:id="rId20"/>
+    <p:sldId id="275" r:id="rId21"/>
+    <p:sldId id="276" r:id="rId22"/>
+    <p:sldId id="277" r:id="rId23"/>
+    <p:sldId id="278" r:id="rId24"/>
+    <p:sldId id="279" r:id="rId25"/>
+    <p:sldId id="280" r:id="rId26"/>
+    <p:sldId id="281" r:id="rId27"/>
+    <p:sldId id="282" r:id="rId28"/>
   </p:sldIdLst>
   <p:sldSz cx="9144000" cy="6858000" type="screen4x3"/>
   <p:notesSz cx="6858000" cy="9144000"/>
@@ -9727,7 +9748,7 @@
           <a:p>
             <a:fld id="{893C82C7-7BE5-4135-8F1E-6994459A8A43}" type="datetimeFigureOut">
               <a:rPr lang="ru-RU" smtClean="0"/>
-              <a:t>29.08.2014</a:t>
+              <a:t>01.09.2014</a:t>
             </a:fld>
             <a:endParaRPr lang="ru-RU"/>
           </a:p>
@@ -9897,7 +9918,7 @@
           <a:p>
             <a:fld id="{893C82C7-7BE5-4135-8F1E-6994459A8A43}" type="datetimeFigureOut">
               <a:rPr lang="ru-RU" smtClean="0"/>
-              <a:t>29.08.2014</a:t>
+              <a:t>01.09.2014</a:t>
             </a:fld>
             <a:endParaRPr lang="ru-RU"/>
           </a:p>
@@ -10077,7 +10098,7 @@
           <a:p>
             <a:fld id="{893C82C7-7BE5-4135-8F1E-6994459A8A43}" type="datetimeFigureOut">
               <a:rPr lang="ru-RU" smtClean="0"/>
-              <a:t>29.08.2014</a:t>
+              <a:t>01.09.2014</a:t>
             </a:fld>
             <a:endParaRPr lang="ru-RU"/>
           </a:p>
@@ -10247,7 +10268,7 @@
           <a:p>
             <a:fld id="{893C82C7-7BE5-4135-8F1E-6994459A8A43}" type="datetimeFigureOut">
               <a:rPr lang="ru-RU" smtClean="0"/>
-              <a:t>29.08.2014</a:t>
+              <a:t>01.09.2014</a:t>
             </a:fld>
             <a:endParaRPr lang="ru-RU"/>
           </a:p>
@@ -10493,7 +10514,7 @@
           <a:p>
             <a:fld id="{893C82C7-7BE5-4135-8F1E-6994459A8A43}" type="datetimeFigureOut">
               <a:rPr lang="ru-RU" smtClean="0"/>
-              <a:t>29.08.2014</a:t>
+              <a:t>01.09.2014</a:t>
             </a:fld>
             <a:endParaRPr lang="ru-RU"/>
           </a:p>
@@ -10781,7 +10802,7 @@
           <a:p>
             <a:fld id="{893C82C7-7BE5-4135-8F1E-6994459A8A43}" type="datetimeFigureOut">
               <a:rPr lang="ru-RU" smtClean="0"/>
-              <a:t>29.08.2014</a:t>
+              <a:t>01.09.2014</a:t>
             </a:fld>
             <a:endParaRPr lang="ru-RU"/>
           </a:p>
@@ -11203,7 +11224,7 @@
           <a:p>
             <a:fld id="{893C82C7-7BE5-4135-8F1E-6994459A8A43}" type="datetimeFigureOut">
               <a:rPr lang="ru-RU" smtClean="0"/>
-              <a:t>29.08.2014</a:t>
+              <a:t>01.09.2014</a:t>
             </a:fld>
             <a:endParaRPr lang="ru-RU"/>
           </a:p>
@@ -11321,7 +11342,7 @@
           <a:p>
             <a:fld id="{893C82C7-7BE5-4135-8F1E-6994459A8A43}" type="datetimeFigureOut">
               <a:rPr lang="ru-RU" smtClean="0"/>
-              <a:t>29.08.2014</a:t>
+              <a:t>01.09.2014</a:t>
             </a:fld>
             <a:endParaRPr lang="ru-RU"/>
           </a:p>
@@ -11416,7 +11437,7 @@
           <a:p>
             <a:fld id="{893C82C7-7BE5-4135-8F1E-6994459A8A43}" type="datetimeFigureOut">
               <a:rPr lang="ru-RU" smtClean="0"/>
-              <a:t>29.08.2014</a:t>
+              <a:t>01.09.2014</a:t>
             </a:fld>
             <a:endParaRPr lang="ru-RU"/>
           </a:p>
@@ -11693,7 +11714,7 @@
           <a:p>
             <a:fld id="{893C82C7-7BE5-4135-8F1E-6994459A8A43}" type="datetimeFigureOut">
               <a:rPr lang="ru-RU" smtClean="0"/>
-              <a:t>29.08.2014</a:t>
+              <a:t>01.09.2014</a:t>
             </a:fld>
             <a:endParaRPr lang="ru-RU"/>
           </a:p>
@@ -11946,7 +11967,7 @@
           <a:p>
             <a:fld id="{893C82C7-7BE5-4135-8F1E-6994459A8A43}" type="datetimeFigureOut">
               <a:rPr lang="ru-RU" smtClean="0"/>
-              <a:t>29.08.2014</a:t>
+              <a:t>01.09.2014</a:t>
             </a:fld>
             <a:endParaRPr lang="ru-RU"/>
           </a:p>
@@ -12159,7 +12180,7 @@
           <a:p>
             <a:fld id="{893C82C7-7BE5-4135-8F1E-6994459A8A43}" type="datetimeFigureOut">
               <a:rPr lang="ru-RU" smtClean="0"/>
-              <a:t>29.08.2014</a:t>
+              <a:t>01.09.2014</a:t>
             </a:fld>
             <a:endParaRPr lang="ru-RU"/>
           </a:p>
@@ -12578,6 +12599,2337 @@
 </p:sld>
 </file>
 
+<file path=ppt/slides/slide10.xml><?xml version="1.0" encoding="utf-8"?>
+<p:sld xmlns:a="http://schemas.openxmlformats.org/drawingml/2006/main" xmlns:r="http://schemas.openxmlformats.org/officeDocument/2006/relationships" xmlns:p="http://schemas.openxmlformats.org/presentationml/2006/main">
+  <p:cSld>
+    <p:spTree>
+      <p:nvGrpSpPr>
+        <p:cNvPr id="1" name=""/>
+        <p:cNvGrpSpPr/>
+        <p:nvPr/>
+      </p:nvGrpSpPr>
+      <p:grpSpPr>
+        <a:xfrm>
+          <a:off x="0" y="0"/>
+          <a:ext cx="0" cy="0"/>
+          <a:chOff x="0" y="0"/>
+          <a:chExt cx="0" cy="0"/>
+        </a:xfrm>
+      </p:grpSpPr>
+      <p:sp>
+        <p:nvSpPr>
+          <p:cNvPr id="2" name="Заголовок 1"/>
+          <p:cNvSpPr>
+            <a:spLocks noGrp="1"/>
+          </p:cNvSpPr>
+          <p:nvPr>
+            <p:ph type="title"/>
+          </p:nvPr>
+        </p:nvSpPr>
+        <p:spPr/>
+        <p:txBody>
+          <a:bodyPr/>
+          <a:lstStyle/>
+          <a:p>
+            <a:r>
+              <a:rPr lang="ru-RU" dirty="0" smtClean="0"/>
+              <a:t>Настройка демона </a:t>
+            </a:r>
+            <a:r>
+              <a:rPr lang="en-US" dirty="0" err="1" smtClean="0"/>
+              <a:t>Gammu-smsd</a:t>
+            </a:r>
+            <a:endParaRPr lang="ru-RU" dirty="0"/>
+          </a:p>
+        </p:txBody>
+      </p:sp>
+      <p:sp>
+        <p:nvSpPr>
+          <p:cNvPr id="3" name="Объект 2"/>
+          <p:cNvSpPr>
+            <a:spLocks noGrp="1"/>
+          </p:cNvSpPr>
+          <p:nvPr>
+            <p:ph idx="1"/>
+          </p:nvPr>
+        </p:nvSpPr>
+        <p:spPr/>
+        <p:txBody>
+          <a:bodyPr>
+            <a:normAutofit fontScale="40000" lnSpcReduction="20000"/>
+          </a:bodyPr>
+          <a:lstStyle/>
+          <a:p>
+            <a:pPr marL="0" indent="0">
+              <a:buNone/>
+            </a:pPr>
+            <a:r>
+              <a:rPr lang="ru-RU" dirty="0" smtClean="0"/>
+              <a:t>Создать файл конфигурации </a:t>
+            </a:r>
+            <a:r>
+              <a:rPr lang="en-US" dirty="0" err="1" smtClean="0"/>
+              <a:t>gammu-smsdrc</a:t>
+            </a:r>
+            <a:r>
+              <a:rPr lang="en-US" dirty="0" smtClean="0"/>
+              <a:t> </a:t>
+            </a:r>
+            <a:r>
+              <a:rPr lang="ru-RU" dirty="0" smtClean="0"/>
+              <a:t>с определенным содержимым и разместить его в папке </a:t>
+            </a:r>
+            <a:r>
+              <a:rPr lang="en-US" dirty="0" smtClean="0"/>
+              <a:t>bin </a:t>
+            </a:r>
+            <a:r>
+              <a:rPr lang="ru-RU" dirty="0" smtClean="0"/>
+              <a:t>директории, куда установлена </a:t>
+            </a:r>
+            <a:r>
+              <a:rPr lang="en-US" dirty="0" err="1" smtClean="0"/>
+              <a:t>gammu</a:t>
+            </a:r>
+            <a:r>
+              <a:rPr lang="ru-RU" dirty="0" smtClean="0"/>
+              <a:t>. </a:t>
+            </a:r>
+            <a:r>
+              <a:rPr lang="en-US" dirty="0" smtClean="0"/>
+              <a:t>(</a:t>
+            </a:r>
+            <a:r>
+              <a:rPr lang="ru-RU" dirty="0" smtClean="0"/>
+              <a:t>Во второй строчке содержимого </a:t>
+            </a:r>
+            <a:r>
+              <a:rPr lang="ru-RU" dirty="0" smtClean="0">
+                <a:solidFill>
+                  <a:srgbClr val="FF0000"/>
+                </a:solidFill>
+              </a:rPr>
+              <a:t>«выделено красным»</a:t>
+            </a:r>
+            <a:r>
+              <a:rPr lang="ru-RU" dirty="0" smtClean="0"/>
+              <a:t> указываем номер порта с предыдущего слайда</a:t>
+            </a:r>
+            <a:r>
+              <a:rPr lang="en-US" dirty="0" smtClean="0"/>
+              <a:t>)</a:t>
+            </a:r>
+            <a:r>
+              <a:rPr lang="ru-RU" dirty="0" smtClean="0"/>
+              <a:t>.</a:t>
+            </a:r>
+          </a:p>
+          <a:p>
+            <a:pPr marL="0" indent="0">
+              <a:buNone/>
+            </a:pPr>
+            <a:r>
+              <a:rPr lang="ru-RU" dirty="0" smtClean="0"/>
+              <a:t>Пример («</a:t>
+            </a:r>
+            <a:r>
+              <a:rPr lang="en-US" dirty="0" smtClean="0"/>
+              <a:t>c</a:t>
+            </a:r>
+            <a:r>
+              <a:rPr lang="en-US" dirty="0"/>
+              <a:t>:\Program Files (x86)\</a:t>
+            </a:r>
+            <a:r>
+              <a:rPr lang="en-US" dirty="0" err="1"/>
+              <a:t>Gammu</a:t>
+            </a:r>
+            <a:r>
+              <a:rPr lang="en-US" dirty="0"/>
+              <a:t> </a:t>
+            </a:r>
+            <a:r>
+              <a:rPr lang="en-US" dirty="0" smtClean="0"/>
+              <a:t>1.33.0\bin\</a:t>
+            </a:r>
+            <a:r>
+              <a:rPr lang="en-US" dirty="0" err="1" smtClean="0"/>
+              <a:t>gammu-smsdrc</a:t>
+            </a:r>
+            <a:r>
+              <a:rPr lang="ru-RU" dirty="0" smtClean="0"/>
+              <a:t>»).</a:t>
+            </a:r>
+          </a:p>
+          <a:p>
+            <a:pPr marL="0" indent="0">
+              <a:buNone/>
+            </a:pPr>
+            <a:r>
+              <a:rPr lang="ru-RU" dirty="0" smtClean="0"/>
+              <a:t>(Содержимое файла конфигурации </a:t>
+            </a:r>
+            <a:r>
+              <a:rPr lang="en-US" dirty="0" err="1" smtClean="0"/>
+              <a:t>gammu-smsdrc</a:t>
+            </a:r>
+            <a:r>
+              <a:rPr lang="en-US" dirty="0" smtClean="0"/>
+              <a:t> </a:t>
+            </a:r>
+            <a:r>
+              <a:rPr lang="ru-RU" dirty="0" smtClean="0"/>
+              <a:t>для модема </a:t>
+            </a:r>
+            <a:r>
+              <a:rPr lang="en-US" dirty="0" smtClean="0"/>
+              <a:t>E-352 Huawei</a:t>
+            </a:r>
+            <a:r>
+              <a:rPr lang="ru-RU" dirty="0" smtClean="0"/>
+              <a:t> приведено ниже.)</a:t>
+            </a:r>
+          </a:p>
+          <a:p>
+            <a:pPr marL="0" indent="0">
+              <a:buNone/>
+            </a:pPr>
+            <a:endParaRPr lang="en-US" dirty="0" smtClean="0"/>
+          </a:p>
+          <a:p>
+            <a:pPr marL="0" indent="0">
+              <a:buNone/>
+            </a:pPr>
+            <a:r>
+              <a:rPr lang="en-US" sz="3800" dirty="0" smtClean="0"/>
+              <a:t>[</a:t>
+            </a:r>
+            <a:r>
+              <a:rPr lang="en-US" sz="3800" dirty="0" err="1"/>
+              <a:t>gammu</a:t>
+            </a:r>
+            <a:r>
+              <a:rPr lang="en-US" sz="3800" dirty="0"/>
+              <a:t>]</a:t>
+            </a:r>
+          </a:p>
+          <a:p>
+            <a:pPr marL="0" indent="0">
+              <a:buNone/>
+            </a:pPr>
+            <a:r>
+              <a:rPr lang="en-US" sz="3800" dirty="0">
+                <a:solidFill>
+                  <a:srgbClr val="FF0000"/>
+                </a:solidFill>
+              </a:rPr>
+              <a:t>device = com8</a:t>
+            </a:r>
+          </a:p>
+          <a:p>
+            <a:pPr marL="0" indent="0">
+              <a:buNone/>
+            </a:pPr>
+            <a:r>
+              <a:rPr lang="en-US" sz="3800" dirty="0"/>
+              <a:t>connection = at115200</a:t>
+            </a:r>
+          </a:p>
+          <a:p>
+            <a:pPr marL="0" indent="0">
+              <a:buNone/>
+            </a:pPr>
+            <a:r>
+              <a:rPr lang="en-US" sz="3800" dirty="0"/>
+              <a:t>model = at</a:t>
+            </a:r>
+          </a:p>
+          <a:p>
+            <a:pPr marL="0" indent="0">
+              <a:buNone/>
+            </a:pPr>
+            <a:endParaRPr lang="en-US" sz="3800" dirty="0"/>
+          </a:p>
+          <a:p>
+            <a:pPr marL="0" indent="0">
+              <a:buNone/>
+            </a:pPr>
+            <a:r>
+              <a:rPr lang="en-US" sz="3800" dirty="0"/>
+              <a:t>[</a:t>
+            </a:r>
+            <a:r>
+              <a:rPr lang="en-US" sz="3800" dirty="0" err="1"/>
+              <a:t>smsd</a:t>
+            </a:r>
+            <a:r>
+              <a:rPr lang="en-US" sz="3800" dirty="0"/>
+              <a:t>]</a:t>
+            </a:r>
+          </a:p>
+          <a:p>
+            <a:pPr marL="0" indent="0">
+              <a:buNone/>
+            </a:pPr>
+            <a:r>
+              <a:rPr lang="en-US" sz="3800" dirty="0"/>
+              <a:t>service = files</a:t>
+            </a:r>
+          </a:p>
+          <a:p>
+            <a:pPr marL="0" indent="0">
+              <a:buNone/>
+            </a:pPr>
+            <a:r>
+              <a:rPr lang="en-US" sz="3800" dirty="0" err="1"/>
+              <a:t>LogFile</a:t>
+            </a:r>
+            <a:r>
+              <a:rPr lang="en-US" sz="3800" dirty="0"/>
+              <a:t> = c:\gammu\gammu.log</a:t>
+            </a:r>
+          </a:p>
+          <a:p>
+            <a:pPr marL="0" indent="0">
+              <a:buNone/>
+            </a:pPr>
+            <a:r>
+              <a:rPr lang="en-US" sz="3800" dirty="0" err="1"/>
+              <a:t>InboxPath</a:t>
+            </a:r>
+            <a:r>
+              <a:rPr lang="en-US" sz="3800" dirty="0"/>
+              <a:t> = c:\gammu\inbox\</a:t>
+            </a:r>
+          </a:p>
+          <a:p>
+            <a:pPr marL="0" indent="0">
+              <a:buNone/>
+            </a:pPr>
+            <a:r>
+              <a:rPr lang="en-US" sz="3800" dirty="0" err="1"/>
+              <a:t>OutboxPath</a:t>
+            </a:r>
+            <a:r>
+              <a:rPr lang="en-US" sz="3800" dirty="0"/>
+              <a:t> = c:\gammu\outbox\</a:t>
+            </a:r>
+          </a:p>
+          <a:p>
+            <a:pPr marL="0" indent="0">
+              <a:buNone/>
+            </a:pPr>
+            <a:r>
+              <a:rPr lang="en-US" sz="3800" dirty="0" err="1"/>
+              <a:t>SentSMSPath</a:t>
+            </a:r>
+            <a:r>
+              <a:rPr lang="en-US" sz="3800" dirty="0"/>
+              <a:t> = c:\gammu\sent\</a:t>
+            </a:r>
+          </a:p>
+          <a:p>
+            <a:pPr marL="0" indent="0">
+              <a:buNone/>
+            </a:pPr>
+            <a:r>
+              <a:rPr lang="en-US" sz="3800" dirty="0" err="1"/>
+              <a:t>ErrorSMSPath</a:t>
+            </a:r>
+            <a:r>
+              <a:rPr lang="en-US" sz="3800" dirty="0"/>
+              <a:t> = c:\</a:t>
+            </a:r>
+            <a:r>
+              <a:rPr lang="en-US" sz="3800" dirty="0" smtClean="0"/>
+              <a:t>gammu\error\</a:t>
+            </a:r>
+            <a:endParaRPr lang="en-US" sz="3800" dirty="0"/>
+          </a:p>
+        </p:txBody>
+      </p:sp>
+    </p:spTree>
+    <p:extLst>
+      <p:ext uri="{BB962C8B-B14F-4D97-AF65-F5344CB8AC3E}">
+        <p14:creationId xmlns:p14="http://schemas.microsoft.com/office/powerpoint/2010/main" val="600393584"/>
+      </p:ext>
+    </p:extLst>
+  </p:cSld>
+  <p:clrMapOvr>
+    <a:masterClrMapping/>
+  </p:clrMapOvr>
+</p:sld>
+</file>
+
+<file path=ppt/slides/slide11.xml><?xml version="1.0" encoding="utf-8"?>
+<p:sld xmlns:a="http://schemas.openxmlformats.org/drawingml/2006/main" xmlns:r="http://schemas.openxmlformats.org/officeDocument/2006/relationships" xmlns:p="http://schemas.openxmlformats.org/presentationml/2006/main">
+  <p:cSld>
+    <p:spTree>
+      <p:nvGrpSpPr>
+        <p:cNvPr id="1" name=""/>
+        <p:cNvGrpSpPr/>
+        <p:nvPr/>
+      </p:nvGrpSpPr>
+      <p:grpSpPr>
+        <a:xfrm>
+          <a:off x="0" y="0"/>
+          <a:ext cx="0" cy="0"/>
+          <a:chOff x="0" y="0"/>
+          <a:chExt cx="0" cy="0"/>
+        </a:xfrm>
+      </p:grpSpPr>
+      <p:sp>
+        <p:nvSpPr>
+          <p:cNvPr id="2" name="Заголовок 1"/>
+          <p:cNvSpPr>
+            <a:spLocks noGrp="1"/>
+          </p:cNvSpPr>
+          <p:nvPr>
+            <p:ph type="title"/>
+          </p:nvPr>
+        </p:nvSpPr>
+        <p:spPr/>
+        <p:txBody>
+          <a:bodyPr/>
+          <a:lstStyle/>
+          <a:p>
+            <a:r>
+              <a:rPr lang="ru-RU" dirty="0"/>
+              <a:t>Настройка демона </a:t>
+            </a:r>
+            <a:r>
+              <a:rPr lang="en-US" dirty="0" err="1"/>
+              <a:t>Gammu-smsd</a:t>
+            </a:r>
+            <a:endParaRPr lang="ru-RU" dirty="0"/>
+          </a:p>
+        </p:txBody>
+      </p:sp>
+      <p:sp>
+        <p:nvSpPr>
+          <p:cNvPr id="3" name="Объект 2"/>
+          <p:cNvSpPr>
+            <a:spLocks noGrp="1"/>
+          </p:cNvSpPr>
+          <p:nvPr>
+            <p:ph idx="1"/>
+          </p:nvPr>
+        </p:nvSpPr>
+        <p:spPr/>
+        <p:txBody>
+          <a:bodyPr/>
+          <a:lstStyle/>
+          <a:p>
+            <a:pPr marL="0" indent="0">
+              <a:buNone/>
+            </a:pPr>
+            <a:r>
+              <a:rPr lang="ru-RU" sz="1600" dirty="0" smtClean="0"/>
+              <a:t>После этого </a:t>
+            </a:r>
+            <a:r>
+              <a:rPr lang="en-US" sz="1600" dirty="0" err="1" smtClean="0"/>
+              <a:t>gammu-smsd</a:t>
+            </a:r>
+            <a:r>
+              <a:rPr lang="en-US" sz="1600" dirty="0" smtClean="0"/>
+              <a:t> </a:t>
+            </a:r>
+            <a:r>
+              <a:rPr lang="ru-RU" sz="1600" dirty="0" smtClean="0"/>
+              <a:t>необходимо установить и запустить как службу </a:t>
+            </a:r>
+            <a:r>
+              <a:rPr lang="en-US" sz="1600" dirty="0" smtClean="0"/>
+              <a:t>windows:</a:t>
+            </a:r>
+          </a:p>
+          <a:p>
+            <a:pPr marL="514350" indent="-514350">
+              <a:buAutoNum type="arabicParenR"/>
+            </a:pPr>
+            <a:r>
+              <a:rPr lang="ru-RU" sz="1600" dirty="0" smtClean="0"/>
+              <a:t>Открываем командную строку (</a:t>
+            </a:r>
+            <a:r>
+              <a:rPr lang="en-US" sz="1600" dirty="0" smtClean="0"/>
+              <a:t>[WIN+R]</a:t>
+            </a:r>
+            <a:r>
+              <a:rPr lang="ru-RU" sz="1600" dirty="0" smtClean="0"/>
+              <a:t>):</a:t>
+            </a:r>
+          </a:p>
+          <a:p>
+            <a:pPr marL="514350" indent="-514350">
+              <a:buAutoNum type="arabicParenR"/>
+            </a:pPr>
+            <a:endParaRPr lang="ru-RU" sz="1600" dirty="0" smtClean="0"/>
+          </a:p>
+          <a:p>
+            <a:pPr marL="514350" indent="-514350">
+              <a:buAutoNum type="arabicParenR"/>
+            </a:pPr>
+            <a:endParaRPr lang="ru-RU" sz="1600" dirty="0" smtClean="0"/>
+          </a:p>
+          <a:p>
+            <a:pPr marL="514350" indent="-514350">
+              <a:buAutoNum type="arabicParenR"/>
+            </a:pPr>
+            <a:endParaRPr lang="ru-RU" sz="1600" dirty="0"/>
+          </a:p>
+          <a:p>
+            <a:pPr marL="514350" indent="-514350">
+              <a:buAutoNum type="arabicParenR"/>
+            </a:pPr>
+            <a:endParaRPr lang="ru-RU" sz="1600" dirty="0" smtClean="0"/>
+          </a:p>
+          <a:p>
+            <a:pPr marL="514350" indent="-514350">
+              <a:buAutoNum type="arabicParenR"/>
+            </a:pPr>
+            <a:endParaRPr lang="ru-RU" sz="1600" dirty="0"/>
+          </a:p>
+          <a:p>
+            <a:pPr marL="514350" indent="-514350">
+              <a:buAutoNum type="arabicParenR"/>
+            </a:pPr>
+            <a:r>
+              <a:rPr lang="ru-RU" sz="1600" dirty="0" smtClean="0"/>
+              <a:t>Проходим в директорию </a:t>
+            </a:r>
+            <a:r>
+              <a:rPr lang="en-US" sz="1600" dirty="0" smtClean="0"/>
+              <a:t>bin </a:t>
+            </a:r>
+            <a:r>
+              <a:rPr lang="ru-RU" sz="1600" dirty="0" smtClean="0"/>
+              <a:t>демона </a:t>
+            </a:r>
+            <a:r>
+              <a:rPr lang="en-US" sz="1600" dirty="0" err="1" smtClean="0"/>
+              <a:t>gammu-smsd</a:t>
+            </a:r>
+            <a:r>
+              <a:rPr lang="ru-RU" sz="1600" dirty="0" smtClean="0"/>
+              <a:t>.</a:t>
+            </a:r>
+            <a:endParaRPr lang="en-US" sz="1600" dirty="0" smtClean="0"/>
+          </a:p>
+          <a:p>
+            <a:pPr marL="514350" indent="-514350">
+              <a:buAutoNum type="arabicParenR"/>
+            </a:pPr>
+            <a:endParaRPr lang="ru-RU" dirty="0" smtClean="0"/>
+          </a:p>
+        </p:txBody>
+      </p:sp>
+      <p:pic>
+        <p:nvPicPr>
+          <p:cNvPr id="2050" name="Picture 2"/>
+          <p:cNvPicPr>
+            <a:picLocks noChangeAspect="1" noChangeArrowheads="1"/>
+          </p:cNvPicPr>
+          <p:nvPr/>
+        </p:nvPicPr>
+        <p:blipFill>
+          <a:blip r:embed="rId2">
+            <a:extLst>
+              <a:ext uri="{28A0092B-C50C-407E-A947-70E740481C1C}">
+                <a14:useLocalDpi xmlns:a14="http://schemas.microsoft.com/office/drawing/2010/main" val="0"/>
+              </a:ext>
+            </a:extLst>
+          </a:blip>
+          <a:srcRect/>
+          <a:stretch>
+            <a:fillRect/>
+          </a:stretch>
+        </p:blipFill>
+        <p:spPr bwMode="auto">
+          <a:xfrm>
+            <a:off x="3167844" y="2276872"/>
+            <a:ext cx="2664296" cy="1346472"/>
+          </a:xfrm>
+          <a:prstGeom prst="rect">
+            <a:avLst/>
+          </a:prstGeom>
+          <a:noFill/>
+          <a:ln>
+            <a:noFill/>
+          </a:ln>
+          <a:effectLst/>
+          <a:extLst>
+            <a:ext uri="{909E8E84-426E-40DD-AFC4-6F175D3DCCD1}">
+              <a14:hiddenFill xmlns:a14="http://schemas.microsoft.com/office/drawing/2010/main">
+                <a:solidFill>
+                  <a:schemeClr val="accent1"/>
+                </a:solidFill>
+              </a14:hiddenFill>
+            </a:ext>
+            <a:ext uri="{91240B29-F687-4F45-9708-019B960494DF}">
+              <a14:hiddenLine xmlns:a14="http://schemas.microsoft.com/office/drawing/2010/main" w="9525">
+                <a:solidFill>
+                  <a:schemeClr val="tx1"/>
+                </a:solidFill>
+                <a:miter lim="800000"/>
+                <a:headEnd/>
+                <a:tailEnd/>
+              </a14:hiddenLine>
+            </a:ext>
+            <a:ext uri="{AF507438-7753-43E0-B8FC-AC1667EBCBE1}">
+              <a14:hiddenEffects xmlns:a14="http://schemas.microsoft.com/office/drawing/2010/main">
+                <a:effectLst>
+                  <a:outerShdw dist="35921" dir="2700000" algn="ctr" rotWithShape="0">
+                    <a:schemeClr val="bg2"/>
+                  </a:outerShdw>
+                </a:effectLst>
+              </a14:hiddenEffects>
+            </a:ext>
+          </a:extLst>
+        </p:spPr>
+      </p:pic>
+      <p:pic>
+        <p:nvPicPr>
+          <p:cNvPr id="2051" name="Picture 3"/>
+          <p:cNvPicPr>
+            <a:picLocks noChangeAspect="1" noChangeArrowheads="1"/>
+          </p:cNvPicPr>
+          <p:nvPr/>
+        </p:nvPicPr>
+        <p:blipFill>
+          <a:blip r:embed="rId3">
+            <a:extLst>
+              <a:ext uri="{28A0092B-C50C-407E-A947-70E740481C1C}">
+                <a14:useLocalDpi xmlns:a14="http://schemas.microsoft.com/office/drawing/2010/main" val="0"/>
+              </a:ext>
+            </a:extLst>
+          </a:blip>
+          <a:srcRect/>
+          <a:stretch>
+            <a:fillRect/>
+          </a:stretch>
+        </p:blipFill>
+        <p:spPr bwMode="auto">
+          <a:xfrm>
+            <a:off x="1979712" y="4077072"/>
+            <a:ext cx="5040560" cy="2538838"/>
+          </a:xfrm>
+          <a:prstGeom prst="rect">
+            <a:avLst/>
+          </a:prstGeom>
+          <a:noFill/>
+          <a:ln>
+            <a:noFill/>
+          </a:ln>
+          <a:effectLst/>
+          <a:extLst>
+            <a:ext uri="{909E8E84-426E-40DD-AFC4-6F175D3DCCD1}">
+              <a14:hiddenFill xmlns:a14="http://schemas.microsoft.com/office/drawing/2010/main">
+                <a:solidFill>
+                  <a:schemeClr val="accent1"/>
+                </a:solidFill>
+              </a14:hiddenFill>
+            </a:ext>
+            <a:ext uri="{91240B29-F687-4F45-9708-019B960494DF}">
+              <a14:hiddenLine xmlns:a14="http://schemas.microsoft.com/office/drawing/2010/main" w="9525">
+                <a:solidFill>
+                  <a:schemeClr val="tx1"/>
+                </a:solidFill>
+                <a:miter lim="800000"/>
+                <a:headEnd/>
+                <a:tailEnd/>
+              </a14:hiddenLine>
+            </a:ext>
+            <a:ext uri="{AF507438-7753-43E0-B8FC-AC1667EBCBE1}">
+              <a14:hiddenEffects xmlns:a14="http://schemas.microsoft.com/office/drawing/2010/main">
+                <a:effectLst>
+                  <a:outerShdw dist="35921" dir="2700000" algn="ctr" rotWithShape="0">
+                    <a:schemeClr val="bg2"/>
+                  </a:outerShdw>
+                </a:effectLst>
+              </a14:hiddenEffects>
+            </a:ext>
+          </a:extLst>
+        </p:spPr>
+      </p:pic>
+    </p:spTree>
+    <p:extLst>
+      <p:ext uri="{BB962C8B-B14F-4D97-AF65-F5344CB8AC3E}">
+        <p14:creationId xmlns:p14="http://schemas.microsoft.com/office/powerpoint/2010/main" val="3228166364"/>
+      </p:ext>
+    </p:extLst>
+  </p:cSld>
+  <p:clrMapOvr>
+    <a:masterClrMapping/>
+  </p:clrMapOvr>
+</p:sld>
+</file>
+
+<file path=ppt/slides/slide12.xml><?xml version="1.0" encoding="utf-8"?>
+<p:sld xmlns:a="http://schemas.openxmlformats.org/drawingml/2006/main" xmlns:r="http://schemas.openxmlformats.org/officeDocument/2006/relationships" xmlns:p="http://schemas.openxmlformats.org/presentationml/2006/main">
+  <p:cSld>
+    <p:spTree>
+      <p:nvGrpSpPr>
+        <p:cNvPr id="1" name=""/>
+        <p:cNvGrpSpPr/>
+        <p:nvPr/>
+      </p:nvGrpSpPr>
+      <p:grpSpPr>
+        <a:xfrm>
+          <a:off x="0" y="0"/>
+          <a:ext cx="0" cy="0"/>
+          <a:chOff x="0" y="0"/>
+          <a:chExt cx="0" cy="0"/>
+        </a:xfrm>
+      </p:grpSpPr>
+      <p:sp>
+        <p:nvSpPr>
+          <p:cNvPr id="2" name="Заголовок 1"/>
+          <p:cNvSpPr>
+            <a:spLocks noGrp="1"/>
+          </p:cNvSpPr>
+          <p:nvPr>
+            <p:ph type="title"/>
+          </p:nvPr>
+        </p:nvSpPr>
+        <p:spPr/>
+        <p:txBody>
+          <a:bodyPr/>
+          <a:lstStyle/>
+          <a:p>
+            <a:r>
+              <a:rPr lang="ru-RU" dirty="0"/>
+              <a:t>Настройка демона </a:t>
+            </a:r>
+            <a:r>
+              <a:rPr lang="en-US" dirty="0" err="1"/>
+              <a:t>Gammu-smsd</a:t>
+            </a:r>
+            <a:endParaRPr lang="ru-RU" dirty="0"/>
+          </a:p>
+        </p:txBody>
+      </p:sp>
+      <p:sp>
+        <p:nvSpPr>
+          <p:cNvPr id="3" name="Объект 2"/>
+          <p:cNvSpPr>
+            <a:spLocks noGrp="1"/>
+          </p:cNvSpPr>
+          <p:nvPr>
+            <p:ph idx="1"/>
+          </p:nvPr>
+        </p:nvSpPr>
+        <p:spPr/>
+        <p:txBody>
+          <a:bodyPr/>
+          <a:lstStyle/>
+          <a:p>
+            <a:r>
+              <a:rPr lang="ru-RU" dirty="0" smtClean="0"/>
+              <a:t>Выполняем команды</a:t>
+            </a:r>
+          </a:p>
+          <a:p>
+            <a:pPr marL="0" indent="0">
+              <a:buNone/>
+            </a:pPr>
+            <a:r>
+              <a:rPr lang="en-US" dirty="0" smtClean="0"/>
+              <a:t>1) </a:t>
+            </a:r>
+            <a:r>
+              <a:rPr lang="en-US" dirty="0" err="1" smtClean="0"/>
+              <a:t>gammu-smsd</a:t>
+            </a:r>
+            <a:r>
+              <a:rPr lang="en-US" dirty="0" smtClean="0"/>
+              <a:t> –c </a:t>
+            </a:r>
+            <a:r>
+              <a:rPr lang="en-US" dirty="0" err="1" smtClean="0"/>
+              <a:t>gammu-smsdrc</a:t>
+            </a:r>
+            <a:r>
+              <a:rPr lang="en-US" dirty="0" smtClean="0"/>
+              <a:t> –</a:t>
+            </a:r>
+            <a:r>
+              <a:rPr lang="en-US" dirty="0" err="1" smtClean="0"/>
+              <a:t>i</a:t>
+            </a:r>
+            <a:endParaRPr lang="en-US" dirty="0" smtClean="0"/>
+          </a:p>
+          <a:p>
+            <a:pPr marL="0" indent="0">
+              <a:buNone/>
+            </a:pPr>
+            <a:r>
+              <a:rPr lang="en-US" dirty="0" smtClean="0"/>
+              <a:t>2) </a:t>
+            </a:r>
+            <a:r>
+              <a:rPr lang="en-US" dirty="0" err="1" smtClean="0"/>
+              <a:t>gammu-smsd</a:t>
+            </a:r>
+            <a:r>
+              <a:rPr lang="en-US" dirty="0" smtClean="0"/>
+              <a:t> –c </a:t>
+            </a:r>
+            <a:r>
+              <a:rPr lang="en-US" dirty="0" err="1" smtClean="0"/>
+              <a:t>gammu-smsdrc</a:t>
+            </a:r>
+            <a:r>
+              <a:rPr lang="en-US" dirty="0" smtClean="0"/>
+              <a:t> –s</a:t>
+            </a:r>
+          </a:p>
+          <a:p>
+            <a:pPr marL="0" indent="0">
+              <a:buNone/>
+            </a:pPr>
+            <a:r>
+              <a:rPr lang="ru-RU" dirty="0" smtClean="0"/>
+              <a:t>Проверяем готовность в службах </a:t>
+            </a:r>
+            <a:r>
+              <a:rPr lang="en-US" dirty="0" smtClean="0"/>
+              <a:t>windows</a:t>
+            </a:r>
+            <a:r>
+              <a:rPr lang="en-US" dirty="0"/>
+              <a:t>:</a:t>
+            </a:r>
+          </a:p>
+        </p:txBody>
+      </p:sp>
+      <p:pic>
+        <p:nvPicPr>
+          <p:cNvPr id="3074" name="Picture 2"/>
+          <p:cNvPicPr>
+            <a:picLocks noChangeAspect="1" noChangeArrowheads="1"/>
+          </p:cNvPicPr>
+          <p:nvPr/>
+        </p:nvPicPr>
+        <p:blipFill>
+          <a:blip r:embed="rId2">
+            <a:extLst>
+              <a:ext uri="{28A0092B-C50C-407E-A947-70E740481C1C}">
+                <a14:useLocalDpi xmlns:a14="http://schemas.microsoft.com/office/drawing/2010/main" val="0"/>
+              </a:ext>
+            </a:extLst>
+          </a:blip>
+          <a:srcRect/>
+          <a:stretch>
+            <a:fillRect/>
+          </a:stretch>
+        </p:blipFill>
+        <p:spPr bwMode="auto">
+          <a:xfrm>
+            <a:off x="1835696" y="3896688"/>
+            <a:ext cx="6048672" cy="2831232"/>
+          </a:xfrm>
+          <a:prstGeom prst="rect">
+            <a:avLst/>
+          </a:prstGeom>
+          <a:noFill/>
+          <a:ln>
+            <a:noFill/>
+          </a:ln>
+          <a:effectLst/>
+          <a:extLst>
+            <a:ext uri="{909E8E84-426E-40DD-AFC4-6F175D3DCCD1}">
+              <a14:hiddenFill xmlns:a14="http://schemas.microsoft.com/office/drawing/2010/main">
+                <a:solidFill>
+                  <a:schemeClr val="accent1"/>
+                </a:solidFill>
+              </a14:hiddenFill>
+            </a:ext>
+            <a:ext uri="{91240B29-F687-4F45-9708-019B960494DF}">
+              <a14:hiddenLine xmlns:a14="http://schemas.microsoft.com/office/drawing/2010/main" w="9525">
+                <a:solidFill>
+                  <a:schemeClr val="tx1"/>
+                </a:solidFill>
+                <a:miter lim="800000"/>
+                <a:headEnd/>
+                <a:tailEnd/>
+              </a14:hiddenLine>
+            </a:ext>
+            <a:ext uri="{AF507438-7753-43E0-B8FC-AC1667EBCBE1}">
+              <a14:hiddenEffects xmlns:a14="http://schemas.microsoft.com/office/drawing/2010/main">
+                <a:effectLst>
+                  <a:outerShdw dist="35921" dir="2700000" algn="ctr" rotWithShape="0">
+                    <a:schemeClr val="bg2"/>
+                  </a:outerShdw>
+                </a:effectLst>
+              </a14:hiddenEffects>
+            </a:ext>
+          </a:extLst>
+        </p:spPr>
+      </p:pic>
+    </p:spTree>
+    <p:extLst>
+      <p:ext uri="{BB962C8B-B14F-4D97-AF65-F5344CB8AC3E}">
+        <p14:creationId xmlns:p14="http://schemas.microsoft.com/office/powerpoint/2010/main" val="2671273643"/>
+      </p:ext>
+    </p:extLst>
+  </p:cSld>
+  <p:clrMapOvr>
+    <a:masterClrMapping/>
+  </p:clrMapOvr>
+</p:sld>
+</file>
+
+<file path=ppt/slides/slide13.xml><?xml version="1.0" encoding="utf-8"?>
+<p:sld xmlns:a="http://schemas.openxmlformats.org/drawingml/2006/main" xmlns:r="http://schemas.openxmlformats.org/officeDocument/2006/relationships" xmlns:p="http://schemas.openxmlformats.org/presentationml/2006/main">
+  <p:cSld>
+    <p:spTree>
+      <p:nvGrpSpPr>
+        <p:cNvPr id="1" name=""/>
+        <p:cNvGrpSpPr/>
+        <p:nvPr/>
+      </p:nvGrpSpPr>
+      <p:grpSpPr>
+        <a:xfrm>
+          <a:off x="0" y="0"/>
+          <a:ext cx="0" cy="0"/>
+          <a:chOff x="0" y="0"/>
+          <a:chExt cx="0" cy="0"/>
+        </a:xfrm>
+      </p:grpSpPr>
+      <p:sp>
+        <p:nvSpPr>
+          <p:cNvPr id="2" name="Заголовок 1"/>
+          <p:cNvSpPr>
+            <a:spLocks noGrp="1"/>
+          </p:cNvSpPr>
+          <p:nvPr>
+            <p:ph type="title"/>
+          </p:nvPr>
+        </p:nvSpPr>
+        <p:spPr/>
+        <p:txBody>
+          <a:bodyPr/>
+          <a:lstStyle/>
+          <a:p>
+            <a:r>
+              <a:rPr lang="ru-RU" dirty="0" smtClean="0"/>
+              <a:t>Проверка демона </a:t>
+            </a:r>
+            <a:r>
+              <a:rPr lang="en-US" dirty="0" err="1" smtClean="0"/>
+              <a:t>Gammu-smsd</a:t>
+            </a:r>
+            <a:endParaRPr lang="ru-RU" dirty="0"/>
+          </a:p>
+        </p:txBody>
+      </p:sp>
+      <p:sp>
+        <p:nvSpPr>
+          <p:cNvPr id="3" name="Объект 2"/>
+          <p:cNvSpPr>
+            <a:spLocks noGrp="1"/>
+          </p:cNvSpPr>
+          <p:nvPr>
+            <p:ph idx="1"/>
+          </p:nvPr>
+        </p:nvSpPr>
+        <p:spPr/>
+        <p:txBody>
+          <a:bodyPr>
+            <a:normAutofit fontScale="85000" lnSpcReduction="10000"/>
+          </a:bodyPr>
+          <a:lstStyle/>
+          <a:p>
+            <a:r>
+              <a:rPr lang="ru-RU" dirty="0" smtClean="0"/>
+              <a:t>Создаем файл «</a:t>
+            </a:r>
+            <a:r>
+              <a:rPr lang="en-US" dirty="0" smtClean="0"/>
+              <a:t>OUT+79210001122.txt</a:t>
+            </a:r>
+            <a:r>
+              <a:rPr lang="ru-RU" dirty="0" smtClean="0"/>
+              <a:t>»</a:t>
+            </a:r>
+            <a:r>
+              <a:rPr lang="en-US" dirty="0" smtClean="0"/>
+              <a:t> </a:t>
+            </a:r>
+            <a:r>
+              <a:rPr lang="ru-RU" dirty="0" smtClean="0"/>
+              <a:t>с содержимым «</a:t>
+            </a:r>
+            <a:r>
+              <a:rPr lang="en-US" dirty="0" smtClean="0"/>
+              <a:t>Test message</a:t>
+            </a:r>
+            <a:r>
+              <a:rPr lang="ru-RU" dirty="0" smtClean="0"/>
+              <a:t>», где </a:t>
+            </a:r>
+            <a:r>
+              <a:rPr lang="en-US" dirty="0" smtClean="0"/>
+              <a:t>+79210001122 – </a:t>
+            </a:r>
+            <a:r>
+              <a:rPr lang="ru-RU" dirty="0" smtClean="0"/>
+              <a:t>номер телефона, на который будет отправлено тестовое сообщение и перемещаем его в папку </a:t>
+            </a:r>
+            <a:r>
+              <a:rPr lang="en-US" dirty="0" smtClean="0"/>
+              <a:t>outbox (</a:t>
+            </a:r>
+            <a:r>
+              <a:rPr lang="ru-RU" dirty="0" smtClean="0"/>
+              <a:t>в примере </a:t>
+            </a:r>
+            <a:r>
+              <a:rPr lang="en-US" dirty="0" smtClean="0"/>
+              <a:t>c:\gammu\outbox\).</a:t>
+            </a:r>
+          </a:p>
+          <a:p>
+            <a:r>
+              <a:rPr lang="ru-RU" dirty="0" smtClean="0"/>
+              <a:t>В течение минуты-двух наш файл должен пропасть из папки </a:t>
+            </a:r>
+            <a:r>
+              <a:rPr lang="en-US" dirty="0" smtClean="0"/>
+              <a:t>/outbox/</a:t>
+            </a:r>
+            <a:r>
+              <a:rPr lang="ru-RU" dirty="0" smtClean="0"/>
+              <a:t> и номер +79210001122 должен получить тестовое </a:t>
+            </a:r>
+            <a:r>
+              <a:rPr lang="en-US" dirty="0" smtClean="0"/>
+              <a:t>SMS-</a:t>
+            </a:r>
+            <a:r>
+              <a:rPr lang="ru-RU" dirty="0" smtClean="0"/>
+              <a:t>сообщение.</a:t>
+            </a:r>
+          </a:p>
+          <a:p>
+            <a:r>
+              <a:rPr lang="ru-RU" dirty="0" smtClean="0"/>
+              <a:t>Если сообщение получено – демон </a:t>
+            </a:r>
+            <a:r>
+              <a:rPr lang="en-US" dirty="0" err="1" smtClean="0"/>
+              <a:t>Gammu-smsd</a:t>
+            </a:r>
+            <a:r>
+              <a:rPr lang="en-US" dirty="0" smtClean="0"/>
+              <a:t> </a:t>
+            </a:r>
+            <a:r>
+              <a:rPr lang="ru-RU" dirty="0" smtClean="0"/>
+              <a:t>настроен, можно двигаться дальше.</a:t>
+            </a:r>
+            <a:endParaRPr lang="ru-RU" dirty="0"/>
+          </a:p>
+        </p:txBody>
+      </p:sp>
+    </p:spTree>
+    <p:extLst>
+      <p:ext uri="{BB962C8B-B14F-4D97-AF65-F5344CB8AC3E}">
+        <p14:creationId xmlns:p14="http://schemas.microsoft.com/office/powerpoint/2010/main" val="451641809"/>
+      </p:ext>
+    </p:extLst>
+  </p:cSld>
+  <p:clrMapOvr>
+    <a:masterClrMapping/>
+  </p:clrMapOvr>
+</p:sld>
+</file>
+
+<file path=ppt/slides/slide14.xml><?xml version="1.0" encoding="utf-8"?>
+<p:sld xmlns:a="http://schemas.openxmlformats.org/drawingml/2006/main" xmlns:r="http://schemas.openxmlformats.org/officeDocument/2006/relationships" xmlns:p="http://schemas.openxmlformats.org/presentationml/2006/main">
+  <p:cSld>
+    <p:spTree>
+      <p:nvGrpSpPr>
+        <p:cNvPr id="1" name=""/>
+        <p:cNvGrpSpPr/>
+        <p:nvPr/>
+      </p:nvGrpSpPr>
+      <p:grpSpPr>
+        <a:xfrm>
+          <a:off x="0" y="0"/>
+          <a:ext cx="0" cy="0"/>
+          <a:chOff x="0" y="0"/>
+          <a:chExt cx="0" cy="0"/>
+        </a:xfrm>
+      </p:grpSpPr>
+      <p:sp>
+        <p:nvSpPr>
+          <p:cNvPr id="2" name="Заголовок 1"/>
+          <p:cNvSpPr>
+            <a:spLocks noGrp="1"/>
+          </p:cNvSpPr>
+          <p:nvPr>
+            <p:ph type="title"/>
+          </p:nvPr>
+        </p:nvSpPr>
+        <p:spPr/>
+        <p:txBody>
+          <a:bodyPr/>
+          <a:lstStyle/>
+          <a:p>
+            <a:r>
+              <a:rPr lang="ru-RU" dirty="0" smtClean="0"/>
+              <a:t>Настройка </a:t>
+            </a:r>
+            <a:r>
+              <a:rPr lang="en-US" dirty="0" err="1" smtClean="0"/>
+              <a:t>symfony</a:t>
+            </a:r>
+            <a:endParaRPr lang="ru-RU" dirty="0"/>
+          </a:p>
+        </p:txBody>
+      </p:sp>
+      <p:sp>
+        <p:nvSpPr>
+          <p:cNvPr id="3" name="Объект 2"/>
+          <p:cNvSpPr>
+            <a:spLocks noGrp="1"/>
+          </p:cNvSpPr>
+          <p:nvPr>
+            <p:ph idx="1"/>
+          </p:nvPr>
+        </p:nvSpPr>
+        <p:spPr/>
+        <p:txBody>
+          <a:bodyPr>
+            <a:normAutofit fontScale="92500" lnSpcReduction="10000"/>
+          </a:bodyPr>
+          <a:lstStyle/>
+          <a:p>
+            <a:r>
+              <a:rPr lang="ru-RU" dirty="0" smtClean="0"/>
+              <a:t>В файле «</a:t>
+            </a:r>
+            <a:r>
+              <a:rPr lang="en-US" dirty="0" smtClean="0"/>
+              <a:t>..\</a:t>
+            </a:r>
+            <a:r>
+              <a:rPr lang="en-US" dirty="0" err="1" smtClean="0"/>
+              <a:t>symfony</a:t>
+            </a:r>
+            <a:r>
+              <a:rPr lang="en-US" dirty="0" smtClean="0"/>
+              <a:t>\</a:t>
+            </a:r>
+            <a:r>
+              <a:rPr lang="en-US" dirty="0" err="1" smtClean="0"/>
+              <a:t>config</a:t>
+            </a:r>
+            <a:r>
+              <a:rPr lang="en-US" dirty="0" smtClean="0"/>
+              <a:t>\gammu.ini</a:t>
+            </a:r>
+            <a:r>
+              <a:rPr lang="ru-RU" dirty="0" smtClean="0"/>
+              <a:t>» указываем директории, с которыми работает </a:t>
+            </a:r>
+            <a:r>
+              <a:rPr lang="en-US" dirty="0" err="1" smtClean="0"/>
+              <a:t>gammu</a:t>
+            </a:r>
+            <a:r>
+              <a:rPr lang="en-US" dirty="0" smtClean="0"/>
+              <a:t>. </a:t>
+            </a:r>
+            <a:r>
+              <a:rPr lang="ru-RU" dirty="0" smtClean="0"/>
+              <a:t>(Необходимо, чтобы </a:t>
+            </a:r>
+            <a:r>
+              <a:rPr lang="en-US" dirty="0" smtClean="0"/>
+              <a:t>web-</a:t>
+            </a:r>
+            <a:r>
+              <a:rPr lang="ru-RU" dirty="0" smtClean="0"/>
+              <a:t>интерфейс пользователя мог отправлять </a:t>
+            </a:r>
+            <a:r>
+              <a:rPr lang="en-US" dirty="0" smtClean="0"/>
+              <a:t>SMS </a:t>
+            </a:r>
+            <a:r>
+              <a:rPr lang="ru-RU" dirty="0" smtClean="0"/>
+              <a:t>через </a:t>
+            </a:r>
+            <a:r>
+              <a:rPr lang="en-US" dirty="0" err="1" smtClean="0"/>
+              <a:t>Gammu</a:t>
+            </a:r>
+            <a:r>
+              <a:rPr lang="ru-RU" dirty="0" smtClean="0"/>
+              <a:t>).</a:t>
+            </a:r>
+            <a:endParaRPr lang="ru-RU" dirty="0"/>
+          </a:p>
+          <a:p>
+            <a:r>
+              <a:rPr lang="ru-RU" dirty="0" smtClean="0"/>
+              <a:t>Пример содержимого файла </a:t>
+            </a:r>
+            <a:r>
+              <a:rPr lang="en-US" dirty="0" smtClean="0"/>
+              <a:t>gammu.ini</a:t>
+            </a:r>
+            <a:r>
+              <a:rPr lang="ru-RU" dirty="0" smtClean="0"/>
+              <a:t> приведен ниже:</a:t>
+            </a:r>
+          </a:p>
+          <a:p>
+            <a:pPr marL="0" indent="0">
+              <a:spcBef>
+                <a:spcPts val="0"/>
+              </a:spcBef>
+              <a:buNone/>
+            </a:pPr>
+            <a:endParaRPr lang="ru-RU" sz="2000" dirty="0" smtClean="0"/>
+          </a:p>
+          <a:p>
+            <a:pPr marL="0" indent="0">
+              <a:spcBef>
+                <a:spcPts val="0"/>
+              </a:spcBef>
+              <a:buNone/>
+            </a:pPr>
+            <a:r>
+              <a:rPr lang="en-US" sz="2000" dirty="0" smtClean="0"/>
+              <a:t>inbox </a:t>
+            </a:r>
+            <a:r>
+              <a:rPr lang="en-US" sz="2000" dirty="0"/>
+              <a:t>= "c:\gammu\inbox"</a:t>
+            </a:r>
+          </a:p>
+          <a:p>
+            <a:pPr marL="0" indent="0">
+              <a:spcBef>
+                <a:spcPts val="0"/>
+              </a:spcBef>
+              <a:buNone/>
+            </a:pPr>
+            <a:r>
+              <a:rPr lang="en-US" sz="2000" dirty="0"/>
+              <a:t>outbox = "c:\gammu\outbox"</a:t>
+            </a:r>
+          </a:p>
+          <a:p>
+            <a:pPr marL="0" indent="0">
+              <a:spcBef>
+                <a:spcPts val="0"/>
+              </a:spcBef>
+              <a:buNone/>
+            </a:pPr>
+            <a:r>
+              <a:rPr lang="en-US" sz="2000" dirty="0"/>
+              <a:t>sent = "c:\gammu\sent"</a:t>
+            </a:r>
+          </a:p>
+          <a:p>
+            <a:pPr marL="0" indent="0">
+              <a:spcBef>
+                <a:spcPts val="0"/>
+              </a:spcBef>
+              <a:buNone/>
+            </a:pPr>
+            <a:r>
+              <a:rPr lang="en-US" sz="2000" dirty="0"/>
+              <a:t>errors = "c:\gammu\errors"</a:t>
+            </a:r>
+            <a:endParaRPr lang="ru-RU" sz="2000" dirty="0"/>
+          </a:p>
+        </p:txBody>
+      </p:sp>
+    </p:spTree>
+    <p:extLst>
+      <p:ext uri="{BB962C8B-B14F-4D97-AF65-F5344CB8AC3E}">
+        <p14:creationId xmlns:p14="http://schemas.microsoft.com/office/powerpoint/2010/main" val="3100291598"/>
+      </p:ext>
+    </p:extLst>
+  </p:cSld>
+  <p:clrMapOvr>
+    <a:masterClrMapping/>
+  </p:clrMapOvr>
+</p:sld>
+</file>
+
+<file path=ppt/slides/slide15.xml><?xml version="1.0" encoding="utf-8"?>
+<p:sld xmlns:a="http://schemas.openxmlformats.org/drawingml/2006/main" xmlns:r="http://schemas.openxmlformats.org/officeDocument/2006/relationships" xmlns:p="http://schemas.openxmlformats.org/presentationml/2006/main">
+  <p:cSld>
+    <p:spTree>
+      <p:nvGrpSpPr>
+        <p:cNvPr id="1" name=""/>
+        <p:cNvGrpSpPr/>
+        <p:nvPr/>
+      </p:nvGrpSpPr>
+      <p:grpSpPr>
+        <a:xfrm>
+          <a:off x="0" y="0"/>
+          <a:ext cx="0" cy="0"/>
+          <a:chOff x="0" y="0"/>
+          <a:chExt cx="0" cy="0"/>
+        </a:xfrm>
+      </p:grpSpPr>
+      <p:sp>
+        <p:nvSpPr>
+          <p:cNvPr id="2" name="Заголовок 1"/>
+          <p:cNvSpPr>
+            <a:spLocks noGrp="1"/>
+          </p:cNvSpPr>
+          <p:nvPr>
+            <p:ph type="title"/>
+          </p:nvPr>
+        </p:nvSpPr>
+        <p:spPr/>
+        <p:txBody>
+          <a:bodyPr/>
+          <a:lstStyle/>
+          <a:p>
+            <a:r>
+              <a:rPr lang="ru-RU" dirty="0" smtClean="0"/>
+              <a:t>Настройка </a:t>
+            </a:r>
+            <a:r>
+              <a:rPr lang="en-US" dirty="0" smtClean="0"/>
+              <a:t>SMS Daemon</a:t>
+            </a:r>
+            <a:r>
+              <a:rPr lang="ru-RU" dirty="0" smtClean="0"/>
+              <a:t> </a:t>
+            </a:r>
+            <a:r>
+              <a:rPr lang="en-US" dirty="0" smtClean="0"/>
+              <a:t>Win</a:t>
+            </a:r>
+            <a:endParaRPr lang="ru-RU" dirty="0"/>
+          </a:p>
+        </p:txBody>
+      </p:sp>
+      <p:sp>
+        <p:nvSpPr>
+          <p:cNvPr id="3" name="Объект 2"/>
+          <p:cNvSpPr>
+            <a:spLocks noGrp="1"/>
+          </p:cNvSpPr>
+          <p:nvPr>
+            <p:ph idx="1"/>
+          </p:nvPr>
+        </p:nvSpPr>
+        <p:spPr/>
+        <p:txBody>
+          <a:bodyPr>
+            <a:normAutofit fontScale="77500" lnSpcReduction="20000"/>
+          </a:bodyPr>
+          <a:lstStyle/>
+          <a:p>
+            <a:pPr marL="0" indent="0">
+              <a:buNone/>
+            </a:pPr>
+            <a:r>
+              <a:rPr lang="ru-RU" dirty="0" smtClean="0"/>
+              <a:t>В папке </a:t>
+            </a:r>
+            <a:r>
+              <a:rPr lang="en-US" dirty="0" smtClean="0"/>
+              <a:t>..\</a:t>
+            </a:r>
+            <a:r>
+              <a:rPr lang="en-US" dirty="0" err="1" smtClean="0"/>
+              <a:t>symfony</a:t>
+            </a:r>
+            <a:r>
+              <a:rPr lang="en-US" dirty="0" smtClean="0"/>
+              <a:t>\daemons\</a:t>
+            </a:r>
+            <a:r>
+              <a:rPr lang="en-US" dirty="0" err="1" smtClean="0"/>
+              <a:t>SmsDaemon_Win</a:t>
+            </a:r>
+            <a:r>
+              <a:rPr lang="en-US" dirty="0" smtClean="0"/>
+              <a:t>\</a:t>
+            </a:r>
+            <a:r>
+              <a:rPr lang="en-US" dirty="0" err="1" smtClean="0"/>
+              <a:t>config</a:t>
+            </a:r>
+            <a:r>
+              <a:rPr lang="en-US" dirty="0" smtClean="0"/>
+              <a:t>\</a:t>
+            </a:r>
+          </a:p>
+          <a:p>
+            <a:pPr marL="0" indent="0">
+              <a:buNone/>
+            </a:pPr>
+            <a:r>
+              <a:rPr lang="ru-RU" dirty="0" smtClean="0"/>
+              <a:t>Редактируем файл </a:t>
+            </a:r>
+            <a:r>
+              <a:rPr lang="en-US" dirty="0" smtClean="0"/>
+              <a:t>config.ini </a:t>
+            </a:r>
+            <a:r>
+              <a:rPr lang="ru-RU" dirty="0" smtClean="0"/>
+              <a:t>следующим образом:</a:t>
+            </a:r>
+          </a:p>
+          <a:p>
+            <a:pPr marL="0" indent="0">
+              <a:buNone/>
+            </a:pPr>
+            <a:endParaRPr lang="en-US" sz="1800" dirty="0" smtClean="0"/>
+          </a:p>
+          <a:p>
+            <a:pPr marL="0" indent="0">
+              <a:buNone/>
+            </a:pPr>
+            <a:r>
+              <a:rPr lang="en-US" sz="1800" dirty="0" err="1" smtClean="0"/>
+              <a:t>gammupath</a:t>
+            </a:r>
+            <a:r>
+              <a:rPr lang="en-US" sz="1800" dirty="0" smtClean="0"/>
+              <a:t> </a:t>
+            </a:r>
+            <a:r>
+              <a:rPr lang="en-US" sz="1800" dirty="0"/>
+              <a:t>= "c:\gammu\"</a:t>
+            </a:r>
+          </a:p>
+          <a:p>
+            <a:pPr marL="0" indent="0">
+              <a:buNone/>
+            </a:pPr>
+            <a:r>
+              <a:rPr lang="en-US" sz="1800" dirty="0" err="1"/>
+              <a:t>dbhost</a:t>
+            </a:r>
+            <a:r>
+              <a:rPr lang="en-US" sz="1800" dirty="0"/>
+              <a:t> = "localhost"</a:t>
+            </a:r>
+          </a:p>
+          <a:p>
+            <a:pPr marL="0" indent="0">
+              <a:buNone/>
+            </a:pPr>
+            <a:r>
+              <a:rPr lang="en-US" sz="1800" dirty="0" err="1"/>
+              <a:t>dbname</a:t>
+            </a:r>
+            <a:r>
+              <a:rPr lang="en-US" sz="1800" dirty="0"/>
+              <a:t> = "</a:t>
+            </a:r>
+            <a:r>
+              <a:rPr lang="en-US" sz="1800" dirty="0" err="1"/>
+              <a:t>mmanager</a:t>
+            </a:r>
+            <a:r>
+              <a:rPr lang="en-US" sz="1800" dirty="0"/>
+              <a:t>"</a:t>
+            </a:r>
+          </a:p>
+          <a:p>
+            <a:pPr marL="0" indent="0">
+              <a:buNone/>
+            </a:pPr>
+            <a:r>
+              <a:rPr lang="en-US" sz="1800" dirty="0" err="1"/>
+              <a:t>dbuser</a:t>
+            </a:r>
+            <a:r>
+              <a:rPr lang="en-US" sz="1800" dirty="0"/>
+              <a:t> = "root"</a:t>
+            </a:r>
+          </a:p>
+          <a:p>
+            <a:pPr marL="0" indent="0">
+              <a:buNone/>
+            </a:pPr>
+            <a:r>
+              <a:rPr lang="en-US" sz="1800" dirty="0" err="1"/>
+              <a:t>dbpassword</a:t>
+            </a:r>
+            <a:r>
+              <a:rPr lang="en-US" sz="1800" dirty="0"/>
+              <a:t> = </a:t>
+            </a:r>
+            <a:r>
+              <a:rPr lang="en-US" sz="1800" dirty="0" smtClean="0"/>
+              <a:t>"“</a:t>
+            </a:r>
+          </a:p>
+          <a:p>
+            <a:pPr marL="0" indent="0">
+              <a:buNone/>
+            </a:pPr>
+            <a:endParaRPr lang="en-US" sz="1800" dirty="0"/>
+          </a:p>
+          <a:p>
+            <a:pPr marL="0" indent="0">
+              <a:buNone/>
+            </a:pPr>
+            <a:r>
+              <a:rPr lang="ru-RU" dirty="0" smtClean="0"/>
+              <a:t>Здесь </a:t>
+            </a:r>
+            <a:r>
+              <a:rPr lang="en-US" dirty="0" err="1" smtClean="0"/>
+              <a:t>gammupath</a:t>
+            </a:r>
+            <a:r>
+              <a:rPr lang="en-US" dirty="0" smtClean="0"/>
+              <a:t> </a:t>
+            </a:r>
+            <a:r>
+              <a:rPr lang="ru-RU" dirty="0" smtClean="0"/>
+              <a:t>– путь к рабочим папкам </a:t>
+            </a:r>
+            <a:r>
+              <a:rPr lang="en-US" dirty="0" err="1" smtClean="0"/>
+              <a:t>gammu</a:t>
+            </a:r>
+            <a:r>
+              <a:rPr lang="ru-RU" dirty="0" smtClean="0"/>
+              <a:t>, </a:t>
+            </a:r>
+            <a:r>
+              <a:rPr lang="en-US" dirty="0" err="1" smtClean="0"/>
+              <a:t>dbhost</a:t>
+            </a:r>
+            <a:r>
+              <a:rPr lang="en-US" dirty="0" smtClean="0"/>
+              <a:t> = “localhost”</a:t>
+            </a:r>
+            <a:r>
+              <a:rPr lang="ru-RU" dirty="0" smtClean="0"/>
+              <a:t> имя или </a:t>
+            </a:r>
+            <a:r>
+              <a:rPr lang="en-US" dirty="0" err="1" smtClean="0"/>
+              <a:t>ip</a:t>
+            </a:r>
+            <a:r>
+              <a:rPr lang="en-US" dirty="0" smtClean="0"/>
+              <a:t> </a:t>
+            </a:r>
+            <a:r>
+              <a:rPr lang="ru-RU" dirty="0" smtClean="0"/>
+              <a:t>адрес хоста, где расположена база данных </a:t>
+            </a:r>
+            <a:r>
+              <a:rPr lang="en-US" dirty="0" err="1" smtClean="0"/>
+              <a:t>mysql</a:t>
+            </a:r>
+            <a:r>
+              <a:rPr lang="en-US" dirty="0"/>
+              <a:t>;</a:t>
+            </a:r>
+            <a:r>
+              <a:rPr lang="ru-RU" dirty="0" smtClean="0"/>
+              <a:t> </a:t>
+            </a:r>
+            <a:endParaRPr lang="en-US" dirty="0" smtClean="0"/>
+          </a:p>
+          <a:p>
+            <a:pPr marL="0" indent="0">
+              <a:buNone/>
+            </a:pPr>
+            <a:r>
+              <a:rPr lang="en-US" dirty="0" err="1" smtClean="0"/>
+              <a:t>dbname</a:t>
+            </a:r>
+            <a:r>
+              <a:rPr lang="en-US" dirty="0" smtClean="0"/>
+              <a:t>=“</a:t>
+            </a:r>
+            <a:r>
+              <a:rPr lang="en-US" dirty="0" err="1" smtClean="0"/>
+              <a:t>mmanager</a:t>
+            </a:r>
+            <a:r>
+              <a:rPr lang="en-US" dirty="0" smtClean="0"/>
+              <a:t>” //</a:t>
+            </a:r>
+            <a:r>
+              <a:rPr lang="ru-RU" dirty="0" smtClean="0"/>
+              <a:t>параметр менять нельзя</a:t>
+            </a:r>
+          </a:p>
+          <a:p>
+            <a:pPr marL="0" indent="0">
+              <a:buNone/>
+            </a:pPr>
+            <a:r>
+              <a:rPr lang="en-US" dirty="0" err="1" smtClean="0"/>
+              <a:t>dbuser</a:t>
+            </a:r>
+            <a:r>
+              <a:rPr lang="en-US" dirty="0" smtClean="0"/>
+              <a:t> = “root” //</a:t>
+            </a:r>
+            <a:r>
+              <a:rPr lang="ru-RU" dirty="0" smtClean="0"/>
+              <a:t>пользователь для доступа к БД</a:t>
+            </a:r>
+          </a:p>
+          <a:p>
+            <a:pPr marL="0" indent="0">
+              <a:buNone/>
+            </a:pPr>
+            <a:r>
+              <a:rPr lang="en-US" dirty="0" err="1" smtClean="0"/>
+              <a:t>dbpassword</a:t>
+            </a:r>
+            <a:r>
+              <a:rPr lang="en-US" dirty="0" smtClean="0"/>
+              <a:t> =  “”</a:t>
+            </a:r>
+            <a:r>
+              <a:rPr lang="ru-RU" dirty="0" smtClean="0"/>
+              <a:t> </a:t>
+            </a:r>
+            <a:r>
+              <a:rPr lang="en-US" dirty="0" smtClean="0"/>
+              <a:t>//</a:t>
+            </a:r>
+            <a:r>
+              <a:rPr lang="ru-RU" dirty="0" smtClean="0"/>
+              <a:t>пароль </a:t>
+            </a:r>
+            <a:r>
+              <a:rPr lang="ru-RU" dirty="0"/>
+              <a:t>пользователя БД</a:t>
+            </a:r>
+          </a:p>
+        </p:txBody>
+      </p:sp>
+    </p:spTree>
+    <p:extLst>
+      <p:ext uri="{BB962C8B-B14F-4D97-AF65-F5344CB8AC3E}">
+        <p14:creationId xmlns:p14="http://schemas.microsoft.com/office/powerpoint/2010/main" val="120283450"/>
+      </p:ext>
+    </p:extLst>
+  </p:cSld>
+  <p:clrMapOvr>
+    <a:masterClrMapping/>
+  </p:clrMapOvr>
+</p:sld>
+</file>
+
+<file path=ppt/slides/slide16.xml><?xml version="1.0" encoding="utf-8"?>
+<p:sld xmlns:a="http://schemas.openxmlformats.org/drawingml/2006/main" xmlns:r="http://schemas.openxmlformats.org/officeDocument/2006/relationships" xmlns:p="http://schemas.openxmlformats.org/presentationml/2006/main">
+  <p:cSld>
+    <p:spTree>
+      <p:nvGrpSpPr>
+        <p:cNvPr id="1" name=""/>
+        <p:cNvGrpSpPr/>
+        <p:nvPr/>
+      </p:nvGrpSpPr>
+      <p:grpSpPr>
+        <a:xfrm>
+          <a:off x="0" y="0"/>
+          <a:ext cx="0" cy="0"/>
+          <a:chOff x="0" y="0"/>
+          <a:chExt cx="0" cy="0"/>
+        </a:xfrm>
+      </p:grpSpPr>
+      <p:sp>
+        <p:nvSpPr>
+          <p:cNvPr id="2" name="Заголовок 1"/>
+          <p:cNvSpPr>
+            <a:spLocks noGrp="1"/>
+          </p:cNvSpPr>
+          <p:nvPr>
+            <p:ph type="title"/>
+          </p:nvPr>
+        </p:nvSpPr>
+        <p:spPr/>
+        <p:txBody>
+          <a:bodyPr/>
+          <a:lstStyle/>
+          <a:p>
+            <a:r>
+              <a:rPr lang="ru-RU" dirty="0" smtClean="0"/>
+              <a:t>Запуск демона </a:t>
+            </a:r>
+            <a:r>
+              <a:rPr lang="en-US" dirty="0" smtClean="0"/>
+              <a:t>SMS Daemon</a:t>
+            </a:r>
+            <a:endParaRPr lang="ru-RU" dirty="0"/>
+          </a:p>
+        </p:txBody>
+      </p:sp>
+      <p:sp>
+        <p:nvSpPr>
+          <p:cNvPr id="3" name="Объект 2"/>
+          <p:cNvSpPr>
+            <a:spLocks noGrp="1"/>
+          </p:cNvSpPr>
+          <p:nvPr>
+            <p:ph idx="1"/>
+          </p:nvPr>
+        </p:nvSpPr>
+        <p:spPr/>
+        <p:txBody>
+          <a:bodyPr/>
+          <a:lstStyle/>
+          <a:p>
+            <a:r>
+              <a:rPr lang="ru-RU" dirty="0" smtClean="0"/>
+              <a:t>В папке </a:t>
+            </a:r>
+            <a:r>
+              <a:rPr lang="en-US" dirty="0" err="1" smtClean="0"/>
+              <a:t>SmsDaemon_Win</a:t>
+            </a:r>
+            <a:r>
+              <a:rPr lang="en-US" dirty="0" smtClean="0"/>
+              <a:t> </a:t>
+            </a:r>
+            <a:r>
+              <a:rPr lang="ru-RU" dirty="0" smtClean="0"/>
+              <a:t>запускаем «</a:t>
+            </a:r>
+            <a:r>
+              <a:rPr lang="en-US" dirty="0" smtClean="0"/>
+              <a:t>run.bat</a:t>
+            </a:r>
+            <a:r>
+              <a:rPr lang="ru-RU" dirty="0" smtClean="0"/>
+              <a:t>».</a:t>
+            </a:r>
+          </a:p>
+          <a:p>
+            <a:r>
+              <a:rPr lang="ru-RU" dirty="0" smtClean="0"/>
+              <a:t>Окно с демоном всегда должно быть открыто, иначе система не будет рассылать сообщения по расписанию, записывать входящие сообщения в БД и обновлять статус устройств в пользовательском интерфейсе.</a:t>
+            </a:r>
+            <a:endParaRPr lang="ru-RU" dirty="0"/>
+          </a:p>
+        </p:txBody>
+      </p:sp>
+    </p:spTree>
+    <p:extLst>
+      <p:ext uri="{BB962C8B-B14F-4D97-AF65-F5344CB8AC3E}">
+        <p14:creationId xmlns:p14="http://schemas.microsoft.com/office/powerpoint/2010/main" val="2585197640"/>
+      </p:ext>
+    </p:extLst>
+  </p:cSld>
+  <p:clrMapOvr>
+    <a:masterClrMapping/>
+  </p:clrMapOvr>
+</p:sld>
+</file>
+
+<file path=ppt/slides/slide17.xml><?xml version="1.0" encoding="utf-8"?>
+<p:sld xmlns:a="http://schemas.openxmlformats.org/drawingml/2006/main" xmlns:r="http://schemas.openxmlformats.org/officeDocument/2006/relationships" xmlns:p="http://schemas.openxmlformats.org/presentationml/2006/main">
+  <p:cSld>
+    <p:spTree>
+      <p:nvGrpSpPr>
+        <p:cNvPr id="1" name=""/>
+        <p:cNvGrpSpPr/>
+        <p:nvPr/>
+      </p:nvGrpSpPr>
+      <p:grpSpPr>
+        <a:xfrm>
+          <a:off x="0" y="0"/>
+          <a:ext cx="0" cy="0"/>
+          <a:chOff x="0" y="0"/>
+          <a:chExt cx="0" cy="0"/>
+        </a:xfrm>
+      </p:grpSpPr>
+      <p:sp>
+        <p:nvSpPr>
+          <p:cNvPr id="2" name="Заголовок 1"/>
+          <p:cNvSpPr>
+            <a:spLocks noGrp="1"/>
+          </p:cNvSpPr>
+          <p:nvPr>
+            <p:ph type="title"/>
+          </p:nvPr>
+        </p:nvSpPr>
+        <p:spPr/>
+        <p:txBody>
+          <a:bodyPr/>
+          <a:lstStyle/>
+          <a:p>
+            <a:r>
+              <a:rPr lang="ru-RU" dirty="0" smtClean="0"/>
+              <a:t>Создание БД</a:t>
+            </a:r>
+            <a:r>
+              <a:rPr lang="en-US" dirty="0" smtClean="0"/>
+              <a:t> </a:t>
+            </a:r>
+            <a:r>
+              <a:rPr lang="ru-RU" dirty="0" smtClean="0"/>
+              <a:t>и запуск сервера</a:t>
+            </a:r>
+            <a:endParaRPr lang="ru-RU" dirty="0"/>
+          </a:p>
+        </p:txBody>
+      </p:sp>
+      <p:sp>
+        <p:nvSpPr>
+          <p:cNvPr id="3" name="Объект 2"/>
+          <p:cNvSpPr>
+            <a:spLocks noGrp="1"/>
+          </p:cNvSpPr>
+          <p:nvPr>
+            <p:ph idx="1"/>
+          </p:nvPr>
+        </p:nvSpPr>
+        <p:spPr/>
+        <p:txBody>
+          <a:bodyPr>
+            <a:normAutofit fontScale="85000" lnSpcReduction="20000"/>
+          </a:bodyPr>
+          <a:lstStyle/>
+          <a:p>
+            <a:r>
+              <a:rPr lang="ru-RU" dirty="0" smtClean="0"/>
+              <a:t>Для создания БД после установки демонов открываем командную строку как на слайде 11, заходим в папку </a:t>
+            </a:r>
+            <a:r>
+              <a:rPr lang="en-US" dirty="0" err="1" smtClean="0"/>
+              <a:t>symfony</a:t>
+            </a:r>
+            <a:r>
+              <a:rPr lang="en-US" dirty="0" smtClean="0"/>
+              <a:t> </a:t>
+            </a:r>
+            <a:r>
+              <a:rPr lang="ru-RU" dirty="0" smtClean="0"/>
+              <a:t>и выполняем следующие команды:</a:t>
+            </a:r>
+          </a:p>
+          <a:p>
+            <a:pPr marL="514350" indent="-514350">
+              <a:buAutoNum type="arabicParenR"/>
+            </a:pPr>
+            <a:r>
+              <a:rPr lang="en-US" dirty="0" err="1" smtClean="0"/>
+              <a:t>php</a:t>
+            </a:r>
+            <a:r>
+              <a:rPr lang="en-US" dirty="0" smtClean="0"/>
+              <a:t> app/console </a:t>
+            </a:r>
+            <a:r>
+              <a:rPr lang="en-US" dirty="0" err="1" smtClean="0"/>
+              <a:t>doctrine:database:create</a:t>
+            </a:r>
+            <a:endParaRPr lang="en-US" dirty="0" smtClean="0"/>
+          </a:p>
+          <a:p>
+            <a:pPr marL="514350" indent="-514350">
+              <a:buAutoNum type="arabicParenR"/>
+            </a:pPr>
+            <a:r>
+              <a:rPr lang="en-US" dirty="0" err="1" smtClean="0"/>
+              <a:t>php</a:t>
+            </a:r>
+            <a:r>
+              <a:rPr lang="en-US" dirty="0" smtClean="0"/>
+              <a:t> app/console </a:t>
+            </a:r>
+            <a:r>
+              <a:rPr lang="en-US" dirty="0" err="1" smtClean="0"/>
+              <a:t>doctrine:schema:create</a:t>
+            </a:r>
+            <a:endParaRPr lang="en-US" dirty="0" smtClean="0"/>
+          </a:p>
+          <a:p>
+            <a:pPr marL="514350" indent="-514350">
+              <a:buAutoNum type="arabicParenR"/>
+            </a:pPr>
+            <a:r>
+              <a:rPr lang="en-US" dirty="0" err="1" smtClean="0"/>
+              <a:t>php</a:t>
+            </a:r>
+            <a:r>
+              <a:rPr lang="en-US" dirty="0" smtClean="0"/>
+              <a:t> app/console </a:t>
+            </a:r>
+            <a:r>
+              <a:rPr lang="en-US" dirty="0" err="1" smtClean="0"/>
+              <a:t>server:run</a:t>
+            </a:r>
+            <a:endParaRPr lang="en-US" dirty="0" smtClean="0"/>
+          </a:p>
+          <a:p>
+            <a:pPr marL="0" indent="0">
+              <a:buNone/>
+            </a:pPr>
+            <a:r>
+              <a:rPr lang="en-US" dirty="0" smtClean="0"/>
+              <a:t>4) </a:t>
+            </a:r>
+            <a:r>
+              <a:rPr lang="ru-RU" dirty="0" smtClean="0"/>
+              <a:t>Должно появиться сообщение :</a:t>
+            </a:r>
+          </a:p>
+          <a:p>
+            <a:pPr marL="0" indent="0">
+              <a:buNone/>
+            </a:pPr>
+            <a:r>
+              <a:rPr lang="en-US" dirty="0"/>
+              <a:t>s</a:t>
+            </a:r>
+            <a:r>
+              <a:rPr lang="en-US" dirty="0" smtClean="0"/>
+              <a:t>erver </a:t>
+            </a:r>
+            <a:r>
+              <a:rPr lang="en-US" dirty="0"/>
+              <a:t>running on </a:t>
+            </a:r>
+            <a:r>
+              <a:rPr lang="en-US" dirty="0">
+                <a:hlinkClick r:id="rId2"/>
+              </a:rPr>
+              <a:t>http://</a:t>
+            </a:r>
+            <a:r>
+              <a:rPr lang="en-US" dirty="0" smtClean="0">
+                <a:hlinkClick r:id="rId2"/>
+              </a:rPr>
+              <a:t>localhost:8000</a:t>
+            </a:r>
+            <a:r>
+              <a:rPr lang="ru-RU" dirty="0" smtClean="0"/>
+              <a:t>.</a:t>
+            </a:r>
+          </a:p>
+          <a:p>
+            <a:pPr marL="0" indent="0">
+              <a:buNone/>
+            </a:pPr>
+            <a:r>
+              <a:rPr lang="ru-RU" dirty="0" smtClean="0"/>
+              <a:t>5) Все, открываем браузер (предпочтительно </a:t>
+            </a:r>
+            <a:r>
+              <a:rPr lang="en-US" dirty="0" smtClean="0"/>
+              <a:t>google chrome</a:t>
+            </a:r>
+            <a:r>
+              <a:rPr lang="ru-RU" dirty="0" smtClean="0"/>
+              <a:t>) и проходим по адресу </a:t>
+            </a:r>
+            <a:r>
+              <a:rPr lang="en-US" dirty="0" smtClean="0">
+                <a:hlinkClick r:id="rId2"/>
+              </a:rPr>
+              <a:t>http://localhost:8000</a:t>
+            </a:r>
+            <a:r>
+              <a:rPr lang="en-US" dirty="0" smtClean="0"/>
+              <a:t>.</a:t>
+            </a:r>
+          </a:p>
+          <a:p>
+            <a:pPr marL="0" indent="0">
+              <a:buNone/>
+            </a:pPr>
+            <a:endParaRPr lang="en-US" dirty="0" smtClean="0"/>
+          </a:p>
+        </p:txBody>
+      </p:sp>
+    </p:spTree>
+    <p:extLst>
+      <p:ext uri="{BB962C8B-B14F-4D97-AF65-F5344CB8AC3E}">
+        <p14:creationId xmlns:p14="http://schemas.microsoft.com/office/powerpoint/2010/main" val="65292142"/>
+      </p:ext>
+    </p:extLst>
+  </p:cSld>
+  <p:clrMapOvr>
+    <a:masterClrMapping/>
+  </p:clrMapOvr>
+</p:sld>
+</file>
+
+<file path=ppt/slides/slide18.xml><?xml version="1.0" encoding="utf-8"?>
+<p:sld xmlns:a="http://schemas.openxmlformats.org/drawingml/2006/main" xmlns:r="http://schemas.openxmlformats.org/officeDocument/2006/relationships" xmlns:p="http://schemas.openxmlformats.org/presentationml/2006/main">
+  <p:cSld>
+    <p:spTree>
+      <p:nvGrpSpPr>
+        <p:cNvPr id="1" name=""/>
+        <p:cNvGrpSpPr/>
+        <p:nvPr/>
+      </p:nvGrpSpPr>
+      <p:grpSpPr>
+        <a:xfrm>
+          <a:off x="0" y="0"/>
+          <a:ext cx="0" cy="0"/>
+          <a:chOff x="0" y="0"/>
+          <a:chExt cx="0" cy="0"/>
+        </a:xfrm>
+      </p:grpSpPr>
+      <p:sp>
+        <p:nvSpPr>
+          <p:cNvPr id="2" name="Заголовок 1"/>
+          <p:cNvSpPr>
+            <a:spLocks noGrp="1"/>
+          </p:cNvSpPr>
+          <p:nvPr>
+            <p:ph type="title"/>
+          </p:nvPr>
+        </p:nvSpPr>
+        <p:spPr/>
+        <p:txBody>
+          <a:bodyPr>
+            <a:normAutofit fontScale="90000"/>
+          </a:bodyPr>
+          <a:lstStyle/>
+          <a:p>
+            <a:r>
+              <a:rPr lang="ru-RU" dirty="0" smtClean="0"/>
+              <a:t>Порядок работы с пользовательским интерфейсом</a:t>
+            </a:r>
+            <a:endParaRPr lang="ru-RU" dirty="0"/>
+          </a:p>
+        </p:txBody>
+      </p:sp>
+      <p:sp>
+        <p:nvSpPr>
+          <p:cNvPr id="3" name="Объект 2"/>
+          <p:cNvSpPr>
+            <a:spLocks noGrp="1"/>
+          </p:cNvSpPr>
+          <p:nvPr>
+            <p:ph idx="1"/>
+          </p:nvPr>
+        </p:nvSpPr>
+        <p:spPr/>
+        <p:txBody>
+          <a:bodyPr/>
+          <a:lstStyle/>
+          <a:p>
+            <a:pPr marL="514350" indent="-514350">
+              <a:buAutoNum type="arabicPeriod"/>
+            </a:pPr>
+            <a:r>
+              <a:rPr lang="ru-RU" dirty="0" smtClean="0"/>
+              <a:t>Сначала проходим на вкладку «Список групп. </a:t>
+            </a:r>
+          </a:p>
+          <a:p>
+            <a:pPr marL="0" indent="0">
+              <a:buNone/>
+            </a:pPr>
+            <a:endParaRPr lang="ru-RU" dirty="0"/>
+          </a:p>
+        </p:txBody>
+      </p:sp>
+      <p:pic>
+        <p:nvPicPr>
+          <p:cNvPr id="4098" name="Picture 2"/>
+          <p:cNvPicPr>
+            <a:picLocks noChangeAspect="1" noChangeArrowheads="1"/>
+          </p:cNvPicPr>
+          <p:nvPr/>
+        </p:nvPicPr>
+        <p:blipFill>
+          <a:blip r:embed="rId2">
+            <a:extLst>
+              <a:ext uri="{28A0092B-C50C-407E-A947-70E740481C1C}">
+                <a14:useLocalDpi xmlns:a14="http://schemas.microsoft.com/office/drawing/2010/main" val="0"/>
+              </a:ext>
+            </a:extLst>
+          </a:blip>
+          <a:srcRect/>
+          <a:stretch>
+            <a:fillRect/>
+          </a:stretch>
+        </p:blipFill>
+        <p:spPr bwMode="auto">
+          <a:xfrm>
+            <a:off x="0" y="3762487"/>
+            <a:ext cx="9144000" cy="3103137"/>
+          </a:xfrm>
+          <a:prstGeom prst="rect">
+            <a:avLst/>
+          </a:prstGeom>
+          <a:noFill/>
+          <a:ln>
+            <a:noFill/>
+          </a:ln>
+          <a:effectLst/>
+          <a:extLst>
+            <a:ext uri="{909E8E84-426E-40DD-AFC4-6F175D3DCCD1}">
+              <a14:hiddenFill xmlns:a14="http://schemas.microsoft.com/office/drawing/2010/main">
+                <a:solidFill>
+                  <a:schemeClr val="accent1"/>
+                </a:solidFill>
+              </a14:hiddenFill>
+            </a:ext>
+            <a:ext uri="{91240B29-F687-4F45-9708-019B960494DF}">
+              <a14:hiddenLine xmlns:a14="http://schemas.microsoft.com/office/drawing/2010/main" w="9525">
+                <a:solidFill>
+                  <a:schemeClr val="tx1"/>
+                </a:solidFill>
+                <a:miter lim="800000"/>
+                <a:headEnd/>
+                <a:tailEnd/>
+              </a14:hiddenLine>
+            </a:ext>
+            <a:ext uri="{AF507438-7753-43E0-B8FC-AC1667EBCBE1}">
+              <a14:hiddenEffects xmlns:a14="http://schemas.microsoft.com/office/drawing/2010/main">
+                <a:effectLst>
+                  <a:outerShdw dist="35921" dir="2700000" algn="ctr" rotWithShape="0">
+                    <a:schemeClr val="bg2"/>
+                  </a:outerShdw>
+                </a:effectLst>
+              </a14:hiddenEffects>
+            </a:ext>
+          </a:extLst>
+        </p:spPr>
+      </p:pic>
+    </p:spTree>
+    <p:extLst>
+      <p:ext uri="{BB962C8B-B14F-4D97-AF65-F5344CB8AC3E}">
+        <p14:creationId xmlns:p14="http://schemas.microsoft.com/office/powerpoint/2010/main" val="3028823967"/>
+      </p:ext>
+    </p:extLst>
+  </p:cSld>
+  <p:clrMapOvr>
+    <a:masterClrMapping/>
+  </p:clrMapOvr>
+</p:sld>
+</file>
+
+<file path=ppt/slides/slide19.xml><?xml version="1.0" encoding="utf-8"?>
+<p:sld xmlns:a="http://schemas.openxmlformats.org/drawingml/2006/main" xmlns:r="http://schemas.openxmlformats.org/officeDocument/2006/relationships" xmlns:p="http://schemas.openxmlformats.org/presentationml/2006/main">
+  <p:cSld>
+    <p:spTree>
+      <p:nvGrpSpPr>
+        <p:cNvPr id="1" name=""/>
+        <p:cNvGrpSpPr/>
+        <p:nvPr/>
+      </p:nvGrpSpPr>
+      <p:grpSpPr>
+        <a:xfrm>
+          <a:off x="0" y="0"/>
+          <a:ext cx="0" cy="0"/>
+          <a:chOff x="0" y="0"/>
+          <a:chExt cx="0" cy="0"/>
+        </a:xfrm>
+      </p:grpSpPr>
+      <p:sp>
+        <p:nvSpPr>
+          <p:cNvPr id="2" name="Заголовок 1"/>
+          <p:cNvSpPr>
+            <a:spLocks noGrp="1"/>
+          </p:cNvSpPr>
+          <p:nvPr>
+            <p:ph type="title"/>
+          </p:nvPr>
+        </p:nvSpPr>
+        <p:spPr/>
+        <p:txBody>
+          <a:bodyPr>
+            <a:normAutofit fontScale="90000"/>
+          </a:bodyPr>
+          <a:lstStyle/>
+          <a:p>
+            <a:r>
+              <a:rPr lang="ru-RU" dirty="0" smtClean="0"/>
+              <a:t>Порядок работы с пользовательским интерфейсом</a:t>
+            </a:r>
+            <a:r>
+              <a:rPr lang="en-US" dirty="0"/>
+              <a:t> </a:t>
+            </a:r>
+            <a:r>
+              <a:rPr lang="en-US" dirty="0" smtClean="0"/>
+              <a:t>/ </a:t>
+            </a:r>
+            <a:r>
+              <a:rPr lang="ru-RU" dirty="0" smtClean="0"/>
+              <a:t>Создание группы</a:t>
+            </a:r>
+            <a:endParaRPr lang="ru-RU" dirty="0"/>
+          </a:p>
+        </p:txBody>
+      </p:sp>
+      <p:sp>
+        <p:nvSpPr>
+          <p:cNvPr id="3" name="Объект 2"/>
+          <p:cNvSpPr>
+            <a:spLocks noGrp="1"/>
+          </p:cNvSpPr>
+          <p:nvPr>
+            <p:ph idx="1"/>
+          </p:nvPr>
+        </p:nvSpPr>
+        <p:spPr>
+          <a:xfrm>
+            <a:off x="457200" y="1600201"/>
+            <a:ext cx="8229600" cy="2044824"/>
+          </a:xfrm>
+        </p:spPr>
+        <p:txBody>
+          <a:bodyPr>
+            <a:normAutofit lnSpcReduction="10000"/>
+          </a:bodyPr>
+          <a:lstStyle/>
+          <a:p>
+            <a:r>
+              <a:rPr lang="ru-RU" sz="1600" dirty="0" smtClean="0"/>
+              <a:t>Нажимаем на кнопку «добавить», система предложит указать имя новой группы (вводим название, нажимаем сохранить изменения). Новая группа добавлена. ИМЕНА ГРУПП ЛУЧШЕ ПРОДУМАТЬ СРАЗУ, Т.К. ИЗМЕНИТЬ ИХ В ПРОЦЕССЕ РАБОТЫ НЕВОЗМОЖНО, МОЖНО ТОЛЬКО СОЗДАТЬ НОВУЮ ГРУППУ И УДАЛИТЬ СТАРУЮ.</a:t>
+            </a:r>
+            <a:endParaRPr lang="ru-RU" dirty="0" smtClean="0"/>
+          </a:p>
+          <a:p>
+            <a:pPr marL="0" indent="0">
+              <a:buNone/>
+            </a:pPr>
+            <a:endParaRPr lang="ru-RU" sz="1400" i="1" dirty="0" smtClean="0"/>
+          </a:p>
+          <a:p>
+            <a:pPr marL="0" indent="0">
+              <a:buNone/>
+            </a:pPr>
+            <a:r>
+              <a:rPr lang="en-US" sz="1400" i="1" dirty="0" smtClean="0"/>
+              <a:t>//</a:t>
+            </a:r>
+            <a:r>
+              <a:rPr lang="ru-RU" sz="1400" i="1" dirty="0" smtClean="0"/>
+              <a:t>Группы нужны для того, чтобы была возможность групповой отправки </a:t>
+            </a:r>
+            <a:r>
+              <a:rPr lang="en-US" sz="1400" i="1" dirty="0" smtClean="0"/>
+              <a:t>SMS</a:t>
+            </a:r>
+            <a:r>
+              <a:rPr lang="ru-RU" sz="1400" i="1" dirty="0" smtClean="0"/>
+              <a:t>. Например требуется послать сигнал на выключение группы устройств, у примеру света на какой-нибудь улице, далее мы отмечаем галочкой группу модемов, и нажимаем кнопку «Отправка </a:t>
+            </a:r>
+            <a:r>
+              <a:rPr lang="en-US" sz="1400" i="1" dirty="0" smtClean="0"/>
+              <a:t>SMS</a:t>
+            </a:r>
+            <a:r>
+              <a:rPr lang="ru-RU" sz="1400" i="1" dirty="0" smtClean="0"/>
+              <a:t>» и всем модемам из группы будут отправлены </a:t>
+            </a:r>
+            <a:r>
+              <a:rPr lang="en-US" sz="1400" i="1" dirty="0" smtClean="0"/>
+              <a:t>SMS</a:t>
+            </a:r>
+            <a:r>
+              <a:rPr lang="ru-RU" sz="1400" i="1" dirty="0" smtClean="0"/>
+              <a:t>.</a:t>
+            </a:r>
+            <a:r>
+              <a:rPr lang="en-US" sz="1400" i="1" dirty="0" smtClean="0"/>
+              <a:t> </a:t>
+            </a:r>
+            <a:r>
+              <a:rPr lang="ru-RU" sz="1400" i="1" dirty="0" smtClean="0"/>
+              <a:t>О том как добавить в группу модем, будет рассказано далее.</a:t>
+            </a:r>
+          </a:p>
+        </p:txBody>
+      </p:sp>
+      <p:pic>
+        <p:nvPicPr>
+          <p:cNvPr id="5123" name="Picture 3"/>
+          <p:cNvPicPr>
+            <a:picLocks noChangeAspect="1" noChangeArrowheads="1"/>
+          </p:cNvPicPr>
+          <p:nvPr/>
+        </p:nvPicPr>
+        <p:blipFill>
+          <a:blip r:embed="rId2">
+            <a:extLst>
+              <a:ext uri="{28A0092B-C50C-407E-A947-70E740481C1C}">
+                <a14:useLocalDpi xmlns:a14="http://schemas.microsoft.com/office/drawing/2010/main" val="0"/>
+              </a:ext>
+            </a:extLst>
+          </a:blip>
+          <a:srcRect/>
+          <a:stretch>
+            <a:fillRect/>
+          </a:stretch>
+        </p:blipFill>
+        <p:spPr bwMode="auto">
+          <a:xfrm>
+            <a:off x="179512" y="3645024"/>
+            <a:ext cx="8862424" cy="3096344"/>
+          </a:xfrm>
+          <a:prstGeom prst="rect">
+            <a:avLst/>
+          </a:prstGeom>
+          <a:noFill/>
+          <a:ln>
+            <a:noFill/>
+          </a:ln>
+          <a:effectLst/>
+          <a:extLst>
+            <a:ext uri="{909E8E84-426E-40DD-AFC4-6F175D3DCCD1}">
+              <a14:hiddenFill xmlns:a14="http://schemas.microsoft.com/office/drawing/2010/main">
+                <a:solidFill>
+                  <a:schemeClr val="accent1"/>
+                </a:solidFill>
+              </a14:hiddenFill>
+            </a:ext>
+            <a:ext uri="{91240B29-F687-4F45-9708-019B960494DF}">
+              <a14:hiddenLine xmlns:a14="http://schemas.microsoft.com/office/drawing/2010/main" w="9525">
+                <a:solidFill>
+                  <a:schemeClr val="tx1"/>
+                </a:solidFill>
+                <a:miter lim="800000"/>
+                <a:headEnd/>
+                <a:tailEnd/>
+              </a14:hiddenLine>
+            </a:ext>
+            <a:ext uri="{AF507438-7753-43E0-B8FC-AC1667EBCBE1}">
+              <a14:hiddenEffects xmlns:a14="http://schemas.microsoft.com/office/drawing/2010/main">
+                <a:effectLst>
+                  <a:outerShdw dist="35921" dir="2700000" algn="ctr" rotWithShape="0">
+                    <a:schemeClr val="bg2"/>
+                  </a:outerShdw>
+                </a:effectLst>
+              </a14:hiddenEffects>
+            </a:ext>
+          </a:extLst>
+        </p:spPr>
+      </p:pic>
+    </p:spTree>
+    <p:extLst>
+      <p:ext uri="{BB962C8B-B14F-4D97-AF65-F5344CB8AC3E}">
+        <p14:creationId xmlns:p14="http://schemas.microsoft.com/office/powerpoint/2010/main" val="1230010729"/>
+      </p:ext>
+    </p:extLst>
+  </p:cSld>
+  <p:clrMapOvr>
+    <a:masterClrMapping/>
+  </p:clrMapOvr>
+</p:sld>
+</file>
+
 <file path=ppt/slides/slide2.xml><?xml version="1.0" encoding="utf-8"?>
 <p:sld xmlns:a="http://schemas.openxmlformats.org/drawingml/2006/main" xmlns:r="http://schemas.openxmlformats.org/officeDocument/2006/relationships" xmlns:p="http://schemas.openxmlformats.org/presentationml/2006/main">
   <p:cSld>
@@ -12920,6 +15272,1365 @@
     <p:extLst>
       <p:ext uri="{BB962C8B-B14F-4D97-AF65-F5344CB8AC3E}">
         <p14:creationId xmlns:p14="http://schemas.microsoft.com/office/powerpoint/2010/main" val="4013072247"/>
+      </p:ext>
+    </p:extLst>
+  </p:cSld>
+  <p:clrMapOvr>
+    <a:masterClrMapping/>
+  </p:clrMapOvr>
+</p:sld>
+</file>
+
+<file path=ppt/slides/slide20.xml><?xml version="1.0" encoding="utf-8"?>
+<p:sld xmlns:a="http://schemas.openxmlformats.org/drawingml/2006/main" xmlns:r="http://schemas.openxmlformats.org/officeDocument/2006/relationships" xmlns:p="http://schemas.openxmlformats.org/presentationml/2006/main">
+  <p:cSld>
+    <p:spTree>
+      <p:nvGrpSpPr>
+        <p:cNvPr id="1" name=""/>
+        <p:cNvGrpSpPr/>
+        <p:nvPr/>
+      </p:nvGrpSpPr>
+      <p:grpSpPr>
+        <a:xfrm>
+          <a:off x="0" y="0"/>
+          <a:ext cx="0" cy="0"/>
+          <a:chOff x="0" y="0"/>
+          <a:chExt cx="0" cy="0"/>
+        </a:xfrm>
+      </p:grpSpPr>
+      <p:sp>
+        <p:nvSpPr>
+          <p:cNvPr id="2" name="Заголовок 1"/>
+          <p:cNvSpPr>
+            <a:spLocks noGrp="1"/>
+          </p:cNvSpPr>
+          <p:nvPr>
+            <p:ph type="title"/>
+          </p:nvPr>
+        </p:nvSpPr>
+        <p:spPr/>
+        <p:txBody>
+          <a:bodyPr>
+            <a:noAutofit/>
+          </a:bodyPr>
+          <a:lstStyle/>
+          <a:p>
+            <a:r>
+              <a:rPr lang="ru-RU" sz="3600" dirty="0"/>
+              <a:t>Порядок работы с пользовательским интерфейсом</a:t>
+            </a:r>
+            <a:r>
+              <a:rPr lang="en-US" sz="3600" dirty="0"/>
+              <a:t> / </a:t>
+            </a:r>
+            <a:r>
+              <a:rPr lang="ru-RU" sz="3600" dirty="0"/>
+              <a:t>Создание </a:t>
+            </a:r>
+            <a:r>
+              <a:rPr lang="ru-RU" sz="3600" dirty="0" smtClean="0"/>
+              <a:t>расписания</a:t>
+            </a:r>
+            <a:endParaRPr lang="ru-RU" sz="3600" dirty="0"/>
+          </a:p>
+        </p:txBody>
+      </p:sp>
+      <p:sp>
+        <p:nvSpPr>
+          <p:cNvPr id="3" name="Объект 2"/>
+          <p:cNvSpPr>
+            <a:spLocks noGrp="1"/>
+          </p:cNvSpPr>
+          <p:nvPr>
+            <p:ph idx="1"/>
+          </p:nvPr>
+        </p:nvSpPr>
+        <p:spPr/>
+        <p:txBody>
+          <a:bodyPr/>
+          <a:lstStyle/>
+          <a:p>
+            <a:pPr marL="0" indent="0">
+              <a:buNone/>
+            </a:pPr>
+            <a:r>
+              <a:rPr lang="ru-RU" dirty="0" smtClean="0"/>
+              <a:t>2. Далее проходим на вкладку Расписания</a:t>
+            </a:r>
+          </a:p>
+          <a:p>
+            <a:pPr marL="0" indent="0">
+              <a:buNone/>
+            </a:pPr>
+            <a:r>
+              <a:rPr lang="ru-RU" dirty="0" smtClean="0"/>
+              <a:t>Нажимаем кнопку добавить, в появившемся окне вводим название расписания и нажимаем «Сохранить изменения».</a:t>
+            </a:r>
+          </a:p>
+          <a:p>
+            <a:pPr marL="0" indent="0">
+              <a:buNone/>
+            </a:pPr>
+            <a:endParaRPr lang="ru-RU" dirty="0"/>
+          </a:p>
+        </p:txBody>
+      </p:sp>
+      <p:pic>
+        <p:nvPicPr>
+          <p:cNvPr id="6146" name="Picture 2"/>
+          <p:cNvPicPr>
+            <a:picLocks noChangeAspect="1" noChangeArrowheads="1"/>
+          </p:cNvPicPr>
+          <p:nvPr/>
+        </p:nvPicPr>
+        <p:blipFill>
+          <a:blip r:embed="rId2">
+            <a:extLst>
+              <a:ext uri="{28A0092B-C50C-407E-A947-70E740481C1C}">
+                <a14:useLocalDpi xmlns:a14="http://schemas.microsoft.com/office/drawing/2010/main" val="0"/>
+              </a:ext>
+            </a:extLst>
+          </a:blip>
+          <a:srcRect/>
+          <a:stretch>
+            <a:fillRect/>
+          </a:stretch>
+        </p:blipFill>
+        <p:spPr bwMode="auto">
+          <a:xfrm>
+            <a:off x="114603" y="3810918"/>
+            <a:ext cx="9065909" cy="3074466"/>
+          </a:xfrm>
+          <a:prstGeom prst="rect">
+            <a:avLst/>
+          </a:prstGeom>
+          <a:noFill/>
+          <a:ln>
+            <a:noFill/>
+          </a:ln>
+          <a:effectLst/>
+          <a:extLst>
+            <a:ext uri="{909E8E84-426E-40DD-AFC4-6F175D3DCCD1}">
+              <a14:hiddenFill xmlns:a14="http://schemas.microsoft.com/office/drawing/2010/main">
+                <a:solidFill>
+                  <a:schemeClr val="accent1"/>
+                </a:solidFill>
+              </a14:hiddenFill>
+            </a:ext>
+            <a:ext uri="{91240B29-F687-4F45-9708-019B960494DF}">
+              <a14:hiddenLine xmlns:a14="http://schemas.microsoft.com/office/drawing/2010/main" w="9525">
+                <a:solidFill>
+                  <a:schemeClr val="tx1"/>
+                </a:solidFill>
+                <a:miter lim="800000"/>
+                <a:headEnd/>
+                <a:tailEnd/>
+              </a14:hiddenLine>
+            </a:ext>
+            <a:ext uri="{AF507438-7753-43E0-B8FC-AC1667EBCBE1}">
+              <a14:hiddenEffects xmlns:a14="http://schemas.microsoft.com/office/drawing/2010/main">
+                <a:effectLst>
+                  <a:outerShdw dist="35921" dir="2700000" algn="ctr" rotWithShape="0">
+                    <a:schemeClr val="bg2"/>
+                  </a:outerShdw>
+                </a:effectLst>
+              </a14:hiddenEffects>
+            </a:ext>
+          </a:extLst>
+        </p:spPr>
+      </p:pic>
+    </p:spTree>
+    <p:extLst>
+      <p:ext uri="{BB962C8B-B14F-4D97-AF65-F5344CB8AC3E}">
+        <p14:creationId xmlns:p14="http://schemas.microsoft.com/office/powerpoint/2010/main" val="329732497"/>
+      </p:ext>
+    </p:extLst>
+  </p:cSld>
+  <p:clrMapOvr>
+    <a:masterClrMapping/>
+  </p:clrMapOvr>
+</p:sld>
+</file>
+
+<file path=ppt/slides/slide21.xml><?xml version="1.0" encoding="utf-8"?>
+<p:sld xmlns:a="http://schemas.openxmlformats.org/drawingml/2006/main" xmlns:r="http://schemas.openxmlformats.org/officeDocument/2006/relationships" xmlns:p="http://schemas.openxmlformats.org/presentationml/2006/main">
+  <p:cSld>
+    <p:spTree>
+      <p:nvGrpSpPr>
+        <p:cNvPr id="1" name=""/>
+        <p:cNvGrpSpPr/>
+        <p:nvPr/>
+      </p:nvGrpSpPr>
+      <p:grpSpPr>
+        <a:xfrm>
+          <a:off x="0" y="0"/>
+          <a:ext cx="0" cy="0"/>
+          <a:chOff x="0" y="0"/>
+          <a:chExt cx="0" cy="0"/>
+        </a:xfrm>
+      </p:grpSpPr>
+      <p:sp>
+        <p:nvSpPr>
+          <p:cNvPr id="2" name="Заголовок 1"/>
+          <p:cNvSpPr>
+            <a:spLocks noGrp="1"/>
+          </p:cNvSpPr>
+          <p:nvPr>
+            <p:ph type="title"/>
+          </p:nvPr>
+        </p:nvSpPr>
+        <p:spPr/>
+        <p:txBody>
+          <a:bodyPr>
+            <a:noAutofit/>
+          </a:bodyPr>
+          <a:lstStyle/>
+          <a:p>
+            <a:r>
+              <a:rPr lang="ru-RU" sz="3600" dirty="0"/>
+              <a:t>Порядок работы с пользовательским интерфейсом</a:t>
+            </a:r>
+            <a:r>
+              <a:rPr lang="en-US" sz="3600" dirty="0"/>
+              <a:t> / </a:t>
+            </a:r>
+            <a:r>
+              <a:rPr lang="ru-RU" sz="3600" dirty="0"/>
+              <a:t>Создание расписания</a:t>
+            </a:r>
+          </a:p>
+        </p:txBody>
+      </p:sp>
+      <p:sp>
+        <p:nvSpPr>
+          <p:cNvPr id="3" name="Объект 2"/>
+          <p:cNvSpPr>
+            <a:spLocks noGrp="1"/>
+          </p:cNvSpPr>
+          <p:nvPr>
+            <p:ph idx="1"/>
+          </p:nvPr>
+        </p:nvSpPr>
+        <p:spPr/>
+        <p:txBody>
+          <a:bodyPr>
+            <a:normAutofit/>
+          </a:bodyPr>
+          <a:lstStyle/>
+          <a:p>
+            <a:pPr marL="0" indent="0">
+              <a:buNone/>
+            </a:pPr>
+            <a:r>
+              <a:rPr lang="ru-RU" sz="2000" dirty="0" smtClean="0"/>
+              <a:t>Двойным щелчком по появившемуся расписанию мы попадаем на страницу редактирования расписания. Есть два способа составления : </a:t>
+            </a:r>
+          </a:p>
+          <a:p>
+            <a:pPr marL="0" indent="0">
+              <a:buNone/>
+            </a:pPr>
+            <a:r>
+              <a:rPr lang="ru-RU" sz="2000" dirty="0" smtClean="0"/>
+              <a:t>1) Загрузить из файла </a:t>
+            </a:r>
+            <a:r>
+              <a:rPr lang="en-US" sz="2000" dirty="0" smtClean="0"/>
+              <a:t>excel (Raspisanie.xls) </a:t>
+            </a:r>
+            <a:r>
+              <a:rPr lang="ru-RU" sz="2000" dirty="0" smtClean="0"/>
+              <a:t>,2) Набрать расписание вручную.</a:t>
+            </a:r>
+          </a:p>
+          <a:p>
+            <a:pPr marL="457200" indent="-457200">
+              <a:buAutoNum type="arabicParenR"/>
+            </a:pPr>
+            <a:r>
+              <a:rPr lang="ru-RU" sz="1800" dirty="0" smtClean="0"/>
+              <a:t>Нажмите на кнопку «Выберите файл», и выберите файл </a:t>
+            </a:r>
+            <a:r>
+              <a:rPr lang="en-US" sz="1800" dirty="0" smtClean="0"/>
+              <a:t>Raspisanie.xls</a:t>
+            </a:r>
+            <a:r>
+              <a:rPr lang="ru-RU" sz="1800" dirty="0" smtClean="0"/>
+              <a:t>, через некоторое время система внесет список в расписание.</a:t>
+            </a:r>
+          </a:p>
+          <a:p>
+            <a:pPr marL="457200" indent="-457200">
+              <a:buAutoNum type="arabicParenR"/>
+            </a:pPr>
+            <a:r>
+              <a:rPr lang="ru-RU" sz="1800" dirty="0" smtClean="0"/>
+              <a:t>Выбрать в строчке со знаком «+» дату, время включения и время выключения и нажать на кнопку «+»</a:t>
+            </a:r>
+            <a:r>
+              <a:rPr lang="en-US" sz="1800" dirty="0" smtClean="0"/>
+              <a:t> (</a:t>
+            </a:r>
+            <a:r>
+              <a:rPr lang="ru-RU" sz="1800" dirty="0" smtClean="0"/>
+              <a:t>и так построчно составить вручную</a:t>
+            </a:r>
+            <a:r>
+              <a:rPr lang="en-US" sz="2000" dirty="0" smtClean="0"/>
+              <a:t>)</a:t>
+            </a:r>
+            <a:r>
+              <a:rPr lang="ru-RU" sz="2000" dirty="0" smtClean="0"/>
+              <a:t>.</a:t>
+            </a:r>
+          </a:p>
+        </p:txBody>
+      </p:sp>
+      <p:pic>
+        <p:nvPicPr>
+          <p:cNvPr id="7171" name="Picture 3"/>
+          <p:cNvPicPr>
+            <a:picLocks noChangeAspect="1" noChangeArrowheads="1"/>
+          </p:cNvPicPr>
+          <p:nvPr/>
+        </p:nvPicPr>
+        <p:blipFill>
+          <a:blip r:embed="rId2">
+            <a:extLst>
+              <a:ext uri="{28A0092B-C50C-407E-A947-70E740481C1C}">
+                <a14:useLocalDpi xmlns:a14="http://schemas.microsoft.com/office/drawing/2010/main" val="0"/>
+              </a:ext>
+            </a:extLst>
+          </a:blip>
+          <a:srcRect/>
+          <a:stretch>
+            <a:fillRect/>
+          </a:stretch>
+        </p:blipFill>
+        <p:spPr bwMode="auto">
+          <a:xfrm>
+            <a:off x="-31170" y="4149080"/>
+            <a:ext cx="9145504" cy="2708920"/>
+          </a:xfrm>
+          <a:prstGeom prst="rect">
+            <a:avLst/>
+          </a:prstGeom>
+          <a:noFill/>
+          <a:ln>
+            <a:noFill/>
+          </a:ln>
+          <a:effectLst/>
+          <a:extLst>
+            <a:ext uri="{909E8E84-426E-40DD-AFC4-6F175D3DCCD1}">
+              <a14:hiddenFill xmlns:a14="http://schemas.microsoft.com/office/drawing/2010/main">
+                <a:solidFill>
+                  <a:schemeClr val="accent1"/>
+                </a:solidFill>
+              </a14:hiddenFill>
+            </a:ext>
+            <a:ext uri="{91240B29-F687-4F45-9708-019B960494DF}">
+              <a14:hiddenLine xmlns:a14="http://schemas.microsoft.com/office/drawing/2010/main" w="9525">
+                <a:solidFill>
+                  <a:schemeClr val="tx1"/>
+                </a:solidFill>
+                <a:miter lim="800000"/>
+                <a:headEnd/>
+                <a:tailEnd/>
+              </a14:hiddenLine>
+            </a:ext>
+            <a:ext uri="{AF507438-7753-43E0-B8FC-AC1667EBCBE1}">
+              <a14:hiddenEffects xmlns:a14="http://schemas.microsoft.com/office/drawing/2010/main">
+                <a:effectLst>
+                  <a:outerShdw dist="35921" dir="2700000" algn="ctr" rotWithShape="0">
+                    <a:schemeClr val="bg2"/>
+                  </a:outerShdw>
+                </a:effectLst>
+              </a14:hiddenEffects>
+            </a:ext>
+          </a:extLst>
+        </p:spPr>
+      </p:pic>
+    </p:spTree>
+    <p:extLst>
+      <p:ext uri="{BB962C8B-B14F-4D97-AF65-F5344CB8AC3E}">
+        <p14:creationId xmlns:p14="http://schemas.microsoft.com/office/powerpoint/2010/main" val="3375355010"/>
+      </p:ext>
+    </p:extLst>
+  </p:cSld>
+  <p:clrMapOvr>
+    <a:masterClrMapping/>
+  </p:clrMapOvr>
+</p:sld>
+</file>
+
+<file path=ppt/slides/slide22.xml><?xml version="1.0" encoding="utf-8"?>
+<p:sld xmlns:a="http://schemas.openxmlformats.org/drawingml/2006/main" xmlns:r="http://schemas.openxmlformats.org/officeDocument/2006/relationships" xmlns:p="http://schemas.openxmlformats.org/presentationml/2006/main">
+  <p:cSld>
+    <p:spTree>
+      <p:nvGrpSpPr>
+        <p:cNvPr id="1" name=""/>
+        <p:cNvGrpSpPr/>
+        <p:nvPr/>
+      </p:nvGrpSpPr>
+      <p:grpSpPr>
+        <a:xfrm>
+          <a:off x="0" y="0"/>
+          <a:ext cx="0" cy="0"/>
+          <a:chOff x="0" y="0"/>
+          <a:chExt cx="0" cy="0"/>
+        </a:xfrm>
+      </p:grpSpPr>
+      <p:sp>
+        <p:nvSpPr>
+          <p:cNvPr id="2" name="Заголовок 1"/>
+          <p:cNvSpPr>
+            <a:spLocks noGrp="1"/>
+          </p:cNvSpPr>
+          <p:nvPr>
+            <p:ph type="title"/>
+          </p:nvPr>
+        </p:nvSpPr>
+        <p:spPr/>
+        <p:txBody>
+          <a:bodyPr/>
+          <a:lstStyle/>
+          <a:p>
+            <a:r>
+              <a:rPr lang="ru-RU" dirty="0" smtClean="0"/>
+              <a:t>Регистрация модемов в системе</a:t>
+            </a:r>
+            <a:endParaRPr lang="ru-RU" dirty="0"/>
+          </a:p>
+        </p:txBody>
+      </p:sp>
+      <p:sp>
+        <p:nvSpPr>
+          <p:cNvPr id="3" name="Объект 2"/>
+          <p:cNvSpPr>
+            <a:spLocks noGrp="1"/>
+          </p:cNvSpPr>
+          <p:nvPr>
+            <p:ph idx="1"/>
+          </p:nvPr>
+        </p:nvSpPr>
+        <p:spPr/>
+        <p:txBody>
+          <a:bodyPr>
+            <a:normAutofit/>
+          </a:bodyPr>
+          <a:lstStyle/>
+          <a:p>
+            <a:r>
+              <a:rPr lang="ru-RU" sz="1800" dirty="0" smtClean="0"/>
+              <a:t>Проходим на вкладку «Список модемов».</a:t>
+            </a:r>
+          </a:p>
+          <a:p>
+            <a:pPr marL="0" indent="0">
+              <a:buNone/>
+            </a:pPr>
+            <a:r>
+              <a:rPr lang="ru-RU" sz="1600" dirty="0" smtClean="0"/>
+              <a:t>На этой странице мы видим всю информацию о текущем состоянии системы (статус модема (</a:t>
+            </a:r>
+            <a:r>
+              <a:rPr lang="en-US" sz="1600" dirty="0" smtClean="0"/>
+              <a:t>IN1</a:t>
+            </a:r>
+            <a:r>
+              <a:rPr lang="ru-RU" sz="1600" dirty="0" smtClean="0"/>
+              <a:t> и </a:t>
+            </a:r>
+            <a:r>
+              <a:rPr lang="ru-RU" sz="1600" dirty="0" smtClean="0">
+                <a:solidFill>
+                  <a:srgbClr val="FF0000"/>
+                </a:solidFill>
+              </a:rPr>
+              <a:t>красный фон</a:t>
+            </a:r>
+            <a:r>
+              <a:rPr lang="en-US" sz="1600" dirty="0" smtClean="0"/>
+              <a:t> </a:t>
+            </a:r>
+            <a:r>
+              <a:rPr lang="ru-RU" sz="1600" dirty="0" smtClean="0"/>
+              <a:t>если питание выключено, </a:t>
+            </a:r>
+            <a:r>
+              <a:rPr lang="en-US" sz="1600" dirty="0" smtClean="0"/>
+              <a:t>IN2 </a:t>
+            </a:r>
+            <a:r>
+              <a:rPr lang="ru-RU" sz="1600" dirty="0" smtClean="0"/>
+              <a:t>и </a:t>
+            </a:r>
+            <a:r>
+              <a:rPr lang="ru-RU" sz="1600" dirty="0" smtClean="0">
+                <a:solidFill>
+                  <a:srgbClr val="00B050"/>
+                </a:solidFill>
+              </a:rPr>
+              <a:t>зеленый фон</a:t>
+            </a:r>
+            <a:r>
+              <a:rPr lang="ru-RU" sz="1600" dirty="0" smtClean="0"/>
+              <a:t>, если питание включено), группу, номер телефона, серийный номер, местонахождение, привязанное расписание.) Здесь же можно отправлять </a:t>
+            </a:r>
+            <a:r>
+              <a:rPr lang="en-US" sz="1600" dirty="0" smtClean="0"/>
+              <a:t>SMS </a:t>
+            </a:r>
+            <a:r>
+              <a:rPr lang="ru-RU" sz="1600" dirty="0" smtClean="0"/>
+              <a:t>на конкретный модем, выделив строчку с модемом галочкой</a:t>
+            </a:r>
+            <a:r>
+              <a:rPr lang="en-US" sz="1600" dirty="0" smtClean="0"/>
+              <a:t> </a:t>
+            </a:r>
+            <a:r>
+              <a:rPr lang="ru-RU" sz="1600" dirty="0" smtClean="0"/>
+              <a:t>и щелкнув по кнопке «Отправить </a:t>
+            </a:r>
+            <a:r>
+              <a:rPr lang="en-US" sz="1600" dirty="0" smtClean="0"/>
+              <a:t>SMS</a:t>
+            </a:r>
+            <a:r>
+              <a:rPr lang="ru-RU" sz="1600" dirty="0" smtClean="0"/>
+              <a:t>».</a:t>
+            </a:r>
+          </a:p>
+        </p:txBody>
+      </p:sp>
+      <p:pic>
+        <p:nvPicPr>
+          <p:cNvPr id="4" name="Picture 2"/>
+          <p:cNvPicPr>
+            <a:picLocks noChangeAspect="1" noChangeArrowheads="1"/>
+          </p:cNvPicPr>
+          <p:nvPr/>
+        </p:nvPicPr>
+        <p:blipFill>
+          <a:blip r:embed="rId2">
+            <a:extLst>
+              <a:ext uri="{28A0092B-C50C-407E-A947-70E740481C1C}">
+                <a14:useLocalDpi xmlns:a14="http://schemas.microsoft.com/office/drawing/2010/main" val="0"/>
+              </a:ext>
+            </a:extLst>
+          </a:blip>
+          <a:srcRect/>
+          <a:stretch>
+            <a:fillRect/>
+          </a:stretch>
+        </p:blipFill>
+        <p:spPr bwMode="auto">
+          <a:xfrm>
+            <a:off x="0" y="3762487"/>
+            <a:ext cx="9144000" cy="3103137"/>
+          </a:xfrm>
+          <a:prstGeom prst="rect">
+            <a:avLst/>
+          </a:prstGeom>
+          <a:noFill/>
+          <a:ln>
+            <a:noFill/>
+          </a:ln>
+          <a:effectLst/>
+          <a:extLst>
+            <a:ext uri="{909E8E84-426E-40DD-AFC4-6F175D3DCCD1}">
+              <a14:hiddenFill xmlns:a14="http://schemas.microsoft.com/office/drawing/2010/main">
+                <a:solidFill>
+                  <a:schemeClr val="accent1"/>
+                </a:solidFill>
+              </a14:hiddenFill>
+            </a:ext>
+            <a:ext uri="{91240B29-F687-4F45-9708-019B960494DF}">
+              <a14:hiddenLine xmlns:a14="http://schemas.microsoft.com/office/drawing/2010/main" w="9525">
+                <a:solidFill>
+                  <a:schemeClr val="tx1"/>
+                </a:solidFill>
+                <a:miter lim="800000"/>
+                <a:headEnd/>
+                <a:tailEnd/>
+              </a14:hiddenLine>
+            </a:ext>
+            <a:ext uri="{AF507438-7753-43E0-B8FC-AC1667EBCBE1}">
+              <a14:hiddenEffects xmlns:a14="http://schemas.microsoft.com/office/drawing/2010/main">
+                <a:effectLst>
+                  <a:outerShdw dist="35921" dir="2700000" algn="ctr" rotWithShape="0">
+                    <a:schemeClr val="bg2"/>
+                  </a:outerShdw>
+                </a:effectLst>
+              </a14:hiddenEffects>
+            </a:ext>
+          </a:extLst>
+        </p:spPr>
+      </p:pic>
+    </p:spTree>
+    <p:extLst>
+      <p:ext uri="{BB962C8B-B14F-4D97-AF65-F5344CB8AC3E}">
+        <p14:creationId xmlns:p14="http://schemas.microsoft.com/office/powerpoint/2010/main" val="171557252"/>
+      </p:ext>
+    </p:extLst>
+  </p:cSld>
+  <p:clrMapOvr>
+    <a:masterClrMapping/>
+  </p:clrMapOvr>
+</p:sld>
+</file>
+
+<file path=ppt/slides/slide23.xml><?xml version="1.0" encoding="utf-8"?>
+<p:sld xmlns:a="http://schemas.openxmlformats.org/drawingml/2006/main" xmlns:r="http://schemas.openxmlformats.org/officeDocument/2006/relationships" xmlns:p="http://schemas.openxmlformats.org/presentationml/2006/main">
+  <p:cSld>
+    <p:spTree>
+      <p:nvGrpSpPr>
+        <p:cNvPr id="1" name=""/>
+        <p:cNvGrpSpPr/>
+        <p:nvPr/>
+      </p:nvGrpSpPr>
+      <p:grpSpPr>
+        <a:xfrm>
+          <a:off x="0" y="0"/>
+          <a:ext cx="0" cy="0"/>
+          <a:chOff x="0" y="0"/>
+          <a:chExt cx="0" cy="0"/>
+        </a:xfrm>
+      </p:grpSpPr>
+      <p:sp>
+        <p:nvSpPr>
+          <p:cNvPr id="2" name="Заголовок 1"/>
+          <p:cNvSpPr>
+            <a:spLocks noGrp="1"/>
+          </p:cNvSpPr>
+          <p:nvPr>
+            <p:ph type="title"/>
+          </p:nvPr>
+        </p:nvSpPr>
+        <p:spPr/>
+        <p:txBody>
+          <a:bodyPr/>
+          <a:lstStyle/>
+          <a:p>
+            <a:r>
+              <a:rPr lang="ru-RU" dirty="0"/>
+              <a:t>Регистрация модемов в системе</a:t>
+            </a:r>
+          </a:p>
+        </p:txBody>
+      </p:sp>
+      <p:sp>
+        <p:nvSpPr>
+          <p:cNvPr id="3" name="Объект 2"/>
+          <p:cNvSpPr>
+            <a:spLocks noGrp="1"/>
+          </p:cNvSpPr>
+          <p:nvPr>
+            <p:ph idx="1"/>
+          </p:nvPr>
+        </p:nvSpPr>
+        <p:spPr>
+          <a:xfrm>
+            <a:off x="457200" y="1484784"/>
+            <a:ext cx="8229600" cy="4641379"/>
+          </a:xfrm>
+        </p:spPr>
+        <p:txBody>
+          <a:bodyPr>
+            <a:normAutofit/>
+          </a:bodyPr>
+          <a:lstStyle/>
+          <a:p>
+            <a:r>
+              <a:rPr lang="ru-RU" sz="1400" dirty="0" smtClean="0"/>
+              <a:t>Для регистрации модема в системе нажимаем на кнопку «Добавить модем», вносим необходимую информацию и «</a:t>
+            </a:r>
+            <a:r>
+              <a:rPr lang="ru-RU" sz="1400" dirty="0" smtClean="0">
+                <a:solidFill>
+                  <a:srgbClr val="FF0000"/>
+                </a:solidFill>
+              </a:rPr>
+              <a:t>ВНИМАНИЕ</a:t>
+            </a:r>
+            <a:r>
+              <a:rPr lang="ru-RU" sz="1400" dirty="0" smtClean="0"/>
+              <a:t>» привязываем к модему созданную нами группу и созданное нами расписание. Именно здесь модемы первично включаются в группу и к ним привязывается расписание. </a:t>
+            </a:r>
+            <a:r>
+              <a:rPr lang="ru-RU" sz="1400" dirty="0" smtClean="0">
+                <a:solidFill>
+                  <a:srgbClr val="FF0000"/>
+                </a:solidFill>
+              </a:rPr>
+              <a:t>И ИМЕННО С МОМЕНТА СОХРАНЕНИЯ ЭТОЙ ФОРМЫ</a:t>
+            </a:r>
+            <a:r>
+              <a:rPr lang="ru-RU" sz="1400" dirty="0" smtClean="0"/>
+              <a:t> (если работает демон </a:t>
+            </a:r>
+            <a:r>
+              <a:rPr lang="en-US" sz="1400" dirty="0" smtClean="0"/>
+              <a:t>SMS Daemon</a:t>
+            </a:r>
+            <a:r>
+              <a:rPr lang="ru-RU" sz="1400" dirty="0" smtClean="0"/>
+              <a:t>) система начнет отправлять по расписанию </a:t>
+            </a:r>
+            <a:r>
+              <a:rPr lang="en-US" sz="1400" dirty="0" smtClean="0"/>
+              <a:t>SMS </a:t>
+            </a:r>
+            <a:r>
+              <a:rPr lang="ru-RU" sz="1400" dirty="0" smtClean="0"/>
+              <a:t>сообщения этому модему.</a:t>
+            </a:r>
+          </a:p>
+        </p:txBody>
+      </p:sp>
+      <p:pic>
+        <p:nvPicPr>
+          <p:cNvPr id="8194" name="Picture 2"/>
+          <p:cNvPicPr>
+            <a:picLocks noChangeAspect="1" noChangeArrowheads="1"/>
+          </p:cNvPicPr>
+          <p:nvPr/>
+        </p:nvPicPr>
+        <p:blipFill>
+          <a:blip r:embed="rId2">
+            <a:extLst>
+              <a:ext uri="{28A0092B-C50C-407E-A947-70E740481C1C}">
+                <a14:useLocalDpi xmlns:a14="http://schemas.microsoft.com/office/drawing/2010/main" val="0"/>
+              </a:ext>
+            </a:extLst>
+          </a:blip>
+          <a:srcRect/>
+          <a:stretch>
+            <a:fillRect/>
+          </a:stretch>
+        </p:blipFill>
+        <p:spPr bwMode="auto">
+          <a:xfrm>
+            <a:off x="539552" y="2689374"/>
+            <a:ext cx="8316416" cy="4196010"/>
+          </a:xfrm>
+          <a:prstGeom prst="rect">
+            <a:avLst/>
+          </a:prstGeom>
+          <a:noFill/>
+          <a:ln>
+            <a:noFill/>
+          </a:ln>
+          <a:effectLst/>
+          <a:extLst>
+            <a:ext uri="{909E8E84-426E-40DD-AFC4-6F175D3DCCD1}">
+              <a14:hiddenFill xmlns:a14="http://schemas.microsoft.com/office/drawing/2010/main">
+                <a:solidFill>
+                  <a:schemeClr val="accent1"/>
+                </a:solidFill>
+              </a14:hiddenFill>
+            </a:ext>
+            <a:ext uri="{91240B29-F687-4F45-9708-019B960494DF}">
+              <a14:hiddenLine xmlns:a14="http://schemas.microsoft.com/office/drawing/2010/main" w="9525">
+                <a:solidFill>
+                  <a:schemeClr val="tx1"/>
+                </a:solidFill>
+                <a:miter lim="800000"/>
+                <a:headEnd/>
+                <a:tailEnd/>
+              </a14:hiddenLine>
+            </a:ext>
+            <a:ext uri="{AF507438-7753-43E0-B8FC-AC1667EBCBE1}">
+              <a14:hiddenEffects xmlns:a14="http://schemas.microsoft.com/office/drawing/2010/main">
+                <a:effectLst>
+                  <a:outerShdw dist="35921" dir="2700000" algn="ctr" rotWithShape="0">
+                    <a:schemeClr val="bg2"/>
+                  </a:outerShdw>
+                </a:effectLst>
+              </a14:hiddenEffects>
+            </a:ext>
+          </a:extLst>
+        </p:spPr>
+      </p:pic>
+    </p:spTree>
+    <p:extLst>
+      <p:ext uri="{BB962C8B-B14F-4D97-AF65-F5344CB8AC3E}">
+        <p14:creationId xmlns:p14="http://schemas.microsoft.com/office/powerpoint/2010/main" val="4024466950"/>
+      </p:ext>
+    </p:extLst>
+  </p:cSld>
+  <p:clrMapOvr>
+    <a:masterClrMapping/>
+  </p:clrMapOvr>
+</p:sld>
+</file>
+
+<file path=ppt/slides/slide24.xml><?xml version="1.0" encoding="utf-8"?>
+<p:sld xmlns:a="http://schemas.openxmlformats.org/drawingml/2006/main" xmlns:r="http://schemas.openxmlformats.org/officeDocument/2006/relationships" xmlns:p="http://schemas.openxmlformats.org/presentationml/2006/main">
+  <p:cSld>
+    <p:spTree>
+      <p:nvGrpSpPr>
+        <p:cNvPr id="1" name=""/>
+        <p:cNvGrpSpPr/>
+        <p:nvPr/>
+      </p:nvGrpSpPr>
+      <p:grpSpPr>
+        <a:xfrm>
+          <a:off x="0" y="0"/>
+          <a:ext cx="0" cy="0"/>
+          <a:chOff x="0" y="0"/>
+          <a:chExt cx="0" cy="0"/>
+        </a:xfrm>
+      </p:grpSpPr>
+      <p:sp>
+        <p:nvSpPr>
+          <p:cNvPr id="2" name="Заголовок 1"/>
+          <p:cNvSpPr>
+            <a:spLocks noGrp="1"/>
+          </p:cNvSpPr>
+          <p:nvPr>
+            <p:ph type="title"/>
+          </p:nvPr>
+        </p:nvSpPr>
+        <p:spPr/>
+        <p:txBody>
+          <a:bodyPr/>
+          <a:lstStyle/>
+          <a:p>
+            <a:r>
+              <a:rPr lang="ru-RU" dirty="0" smtClean="0"/>
+              <a:t>Изменение параметров модемов</a:t>
+            </a:r>
+            <a:endParaRPr lang="ru-RU" dirty="0"/>
+          </a:p>
+        </p:txBody>
+      </p:sp>
+      <p:sp>
+        <p:nvSpPr>
+          <p:cNvPr id="3" name="Объект 2"/>
+          <p:cNvSpPr>
+            <a:spLocks noGrp="1"/>
+          </p:cNvSpPr>
+          <p:nvPr>
+            <p:ph idx="1"/>
+          </p:nvPr>
+        </p:nvSpPr>
+        <p:spPr/>
+        <p:txBody>
+          <a:bodyPr>
+            <a:normAutofit/>
+          </a:bodyPr>
+          <a:lstStyle/>
+          <a:p>
+            <a:r>
+              <a:rPr lang="ru-RU" sz="1400" dirty="0" smtClean="0"/>
+              <a:t>Предположим мы хотим изменить группу модема, или расписание, привязанное к модему, или симка осталась старая, а модем заменили на новый и у него сменился серийный номер, это можно сделать двойным кликом по строчке с модемом на вкладке «Список модемов». А ниже на этой же вкладке расположен отчет о последних состояниях модема (когда он включался/выключался последний раз, см. следующий слайд).</a:t>
+            </a:r>
+          </a:p>
+        </p:txBody>
+      </p:sp>
+      <p:pic>
+        <p:nvPicPr>
+          <p:cNvPr id="9218" name="Picture 2"/>
+          <p:cNvPicPr>
+            <a:picLocks noChangeAspect="1" noChangeArrowheads="1"/>
+          </p:cNvPicPr>
+          <p:nvPr/>
+        </p:nvPicPr>
+        <p:blipFill>
+          <a:blip r:embed="rId2">
+            <a:extLst>
+              <a:ext uri="{28A0092B-C50C-407E-A947-70E740481C1C}">
+                <a14:useLocalDpi xmlns:a14="http://schemas.microsoft.com/office/drawing/2010/main" val="0"/>
+              </a:ext>
+            </a:extLst>
+          </a:blip>
+          <a:srcRect/>
+          <a:stretch>
+            <a:fillRect/>
+          </a:stretch>
+        </p:blipFill>
+        <p:spPr bwMode="auto">
+          <a:xfrm>
+            <a:off x="1758117" y="2789366"/>
+            <a:ext cx="5838219" cy="3879994"/>
+          </a:xfrm>
+          <a:prstGeom prst="rect">
+            <a:avLst/>
+          </a:prstGeom>
+          <a:noFill/>
+          <a:ln>
+            <a:noFill/>
+          </a:ln>
+          <a:effectLst/>
+          <a:extLst>
+            <a:ext uri="{909E8E84-426E-40DD-AFC4-6F175D3DCCD1}">
+              <a14:hiddenFill xmlns:a14="http://schemas.microsoft.com/office/drawing/2010/main">
+                <a:solidFill>
+                  <a:schemeClr val="accent1"/>
+                </a:solidFill>
+              </a14:hiddenFill>
+            </a:ext>
+            <a:ext uri="{91240B29-F687-4F45-9708-019B960494DF}">
+              <a14:hiddenLine xmlns:a14="http://schemas.microsoft.com/office/drawing/2010/main" w="9525">
+                <a:solidFill>
+                  <a:schemeClr val="tx1"/>
+                </a:solidFill>
+                <a:miter lim="800000"/>
+                <a:headEnd/>
+                <a:tailEnd/>
+              </a14:hiddenLine>
+            </a:ext>
+            <a:ext uri="{AF507438-7753-43E0-B8FC-AC1667EBCBE1}">
+              <a14:hiddenEffects xmlns:a14="http://schemas.microsoft.com/office/drawing/2010/main">
+                <a:effectLst>
+                  <a:outerShdw dist="35921" dir="2700000" algn="ctr" rotWithShape="0">
+                    <a:schemeClr val="bg2"/>
+                  </a:outerShdw>
+                </a:effectLst>
+              </a14:hiddenEffects>
+            </a:ext>
+          </a:extLst>
+        </p:spPr>
+      </p:pic>
+    </p:spTree>
+    <p:extLst>
+      <p:ext uri="{BB962C8B-B14F-4D97-AF65-F5344CB8AC3E}">
+        <p14:creationId xmlns:p14="http://schemas.microsoft.com/office/powerpoint/2010/main" val="343774785"/>
+      </p:ext>
+    </p:extLst>
+  </p:cSld>
+  <p:clrMapOvr>
+    <a:masterClrMapping/>
+  </p:clrMapOvr>
+</p:sld>
+</file>
+
+<file path=ppt/slides/slide25.xml><?xml version="1.0" encoding="utf-8"?>
+<p:sld xmlns:a="http://schemas.openxmlformats.org/drawingml/2006/main" xmlns:r="http://schemas.openxmlformats.org/officeDocument/2006/relationships" xmlns:p="http://schemas.openxmlformats.org/presentationml/2006/main">
+  <p:cSld>
+    <p:spTree>
+      <p:nvGrpSpPr>
+        <p:cNvPr id="1" name=""/>
+        <p:cNvGrpSpPr/>
+        <p:nvPr/>
+      </p:nvGrpSpPr>
+      <p:grpSpPr>
+        <a:xfrm>
+          <a:off x="0" y="0"/>
+          <a:ext cx="0" cy="0"/>
+          <a:chOff x="0" y="0"/>
+          <a:chExt cx="0" cy="0"/>
+        </a:xfrm>
+      </p:grpSpPr>
+      <p:sp>
+        <p:nvSpPr>
+          <p:cNvPr id="2" name="Заголовок 1"/>
+          <p:cNvSpPr>
+            <a:spLocks noGrp="1"/>
+          </p:cNvSpPr>
+          <p:nvPr>
+            <p:ph type="title"/>
+          </p:nvPr>
+        </p:nvSpPr>
+        <p:spPr/>
+        <p:txBody>
+          <a:bodyPr/>
+          <a:lstStyle/>
+          <a:p>
+            <a:r>
+              <a:rPr lang="ru-RU" dirty="0" smtClean="0"/>
+              <a:t>История состояний модема</a:t>
+            </a:r>
+            <a:endParaRPr lang="ru-RU" dirty="0"/>
+          </a:p>
+        </p:txBody>
+      </p:sp>
+      <p:pic>
+        <p:nvPicPr>
+          <p:cNvPr id="10242" name="Picture 2"/>
+          <p:cNvPicPr>
+            <a:picLocks noChangeAspect="1" noChangeArrowheads="1"/>
+          </p:cNvPicPr>
+          <p:nvPr/>
+        </p:nvPicPr>
+        <p:blipFill>
+          <a:blip r:embed="rId2">
+            <a:extLst>
+              <a:ext uri="{28A0092B-C50C-407E-A947-70E740481C1C}">
+                <a14:useLocalDpi xmlns:a14="http://schemas.microsoft.com/office/drawing/2010/main" val="0"/>
+              </a:ext>
+            </a:extLst>
+          </a:blip>
+          <a:srcRect/>
+          <a:stretch>
+            <a:fillRect/>
+          </a:stretch>
+        </p:blipFill>
+        <p:spPr bwMode="auto">
+          <a:xfrm>
+            <a:off x="0" y="2348880"/>
+            <a:ext cx="9149199" cy="3639493"/>
+          </a:xfrm>
+          <a:prstGeom prst="rect">
+            <a:avLst/>
+          </a:prstGeom>
+          <a:noFill/>
+          <a:ln>
+            <a:noFill/>
+          </a:ln>
+          <a:effectLst/>
+          <a:extLst>
+            <a:ext uri="{909E8E84-426E-40DD-AFC4-6F175D3DCCD1}">
+              <a14:hiddenFill xmlns:a14="http://schemas.microsoft.com/office/drawing/2010/main">
+                <a:solidFill>
+                  <a:schemeClr val="accent1"/>
+                </a:solidFill>
+              </a14:hiddenFill>
+            </a:ext>
+            <a:ext uri="{91240B29-F687-4F45-9708-019B960494DF}">
+              <a14:hiddenLine xmlns:a14="http://schemas.microsoft.com/office/drawing/2010/main" w="9525">
+                <a:solidFill>
+                  <a:schemeClr val="tx1"/>
+                </a:solidFill>
+                <a:miter lim="800000"/>
+                <a:headEnd/>
+                <a:tailEnd/>
+              </a14:hiddenLine>
+            </a:ext>
+            <a:ext uri="{AF507438-7753-43E0-B8FC-AC1667EBCBE1}">
+              <a14:hiddenEffects xmlns:a14="http://schemas.microsoft.com/office/drawing/2010/main">
+                <a:effectLst>
+                  <a:outerShdw dist="35921" dir="2700000" algn="ctr" rotWithShape="0">
+                    <a:schemeClr val="bg2"/>
+                  </a:outerShdw>
+                </a:effectLst>
+              </a14:hiddenEffects>
+            </a:ext>
+          </a:extLst>
+        </p:spPr>
+      </p:pic>
+      <p:sp>
+        <p:nvSpPr>
+          <p:cNvPr id="4" name="TextBox 3"/>
+          <p:cNvSpPr txBox="1"/>
+          <p:nvPr/>
+        </p:nvSpPr>
+        <p:spPr>
+          <a:xfrm>
+            <a:off x="226740" y="1484784"/>
+            <a:ext cx="8483733" cy="646331"/>
+          </a:xfrm>
+          <a:prstGeom prst="rect">
+            <a:avLst/>
+          </a:prstGeom>
+          <a:noFill/>
+        </p:spPr>
+        <p:txBody>
+          <a:bodyPr wrap="none" rtlCol="0">
+            <a:spAutoFit/>
+          </a:bodyPr>
+          <a:lstStyle/>
+          <a:p>
+            <a:r>
+              <a:rPr lang="ru-RU" dirty="0" smtClean="0"/>
+              <a:t>Щелкая по заголовкам всех таблиц в системе ( в примере </a:t>
+            </a:r>
+            <a:r>
+              <a:rPr lang="en-US" dirty="0" smtClean="0"/>
+              <a:t>#, </a:t>
+            </a:r>
+            <a:r>
+              <a:rPr lang="ru-RU" dirty="0" smtClean="0"/>
+              <a:t>Дата, Текст сообщения) </a:t>
+            </a:r>
+          </a:p>
+          <a:p>
+            <a:r>
+              <a:rPr lang="ru-RU" dirty="0" smtClean="0"/>
+              <a:t>строки будут сортироваться в порядке возрастания/убывания.</a:t>
+            </a:r>
+            <a:endParaRPr lang="ru-RU" dirty="0"/>
+          </a:p>
+        </p:txBody>
+      </p:sp>
+    </p:spTree>
+    <p:extLst>
+      <p:ext uri="{BB962C8B-B14F-4D97-AF65-F5344CB8AC3E}">
+        <p14:creationId xmlns:p14="http://schemas.microsoft.com/office/powerpoint/2010/main" val="827426868"/>
+      </p:ext>
+    </p:extLst>
+  </p:cSld>
+  <p:clrMapOvr>
+    <a:masterClrMapping/>
+  </p:clrMapOvr>
+</p:sld>
+</file>
+
+<file path=ppt/slides/slide26.xml><?xml version="1.0" encoding="utf-8"?>
+<p:sld xmlns:a="http://schemas.openxmlformats.org/drawingml/2006/main" xmlns:r="http://schemas.openxmlformats.org/officeDocument/2006/relationships" xmlns:p="http://schemas.openxmlformats.org/presentationml/2006/main">
+  <p:cSld>
+    <p:spTree>
+      <p:nvGrpSpPr>
+        <p:cNvPr id="1" name=""/>
+        <p:cNvGrpSpPr/>
+        <p:nvPr/>
+      </p:nvGrpSpPr>
+      <p:grpSpPr>
+        <a:xfrm>
+          <a:off x="0" y="0"/>
+          <a:ext cx="0" cy="0"/>
+          <a:chOff x="0" y="0"/>
+          <a:chExt cx="0" cy="0"/>
+        </a:xfrm>
+      </p:grpSpPr>
+      <p:sp>
+        <p:nvSpPr>
+          <p:cNvPr id="2" name="Заголовок 1"/>
+          <p:cNvSpPr>
+            <a:spLocks noGrp="1"/>
+          </p:cNvSpPr>
+          <p:nvPr>
+            <p:ph type="title"/>
+          </p:nvPr>
+        </p:nvSpPr>
+        <p:spPr/>
+        <p:txBody>
+          <a:bodyPr>
+            <a:normAutofit fontScale="90000"/>
+          </a:bodyPr>
+          <a:lstStyle/>
+          <a:p>
+            <a:r>
+              <a:rPr lang="ru-RU" dirty="0" smtClean="0"/>
+              <a:t>Просмотр списка модемов в группе</a:t>
+            </a:r>
+            <a:endParaRPr lang="ru-RU" dirty="0"/>
+          </a:p>
+        </p:txBody>
+      </p:sp>
+      <p:sp>
+        <p:nvSpPr>
+          <p:cNvPr id="3" name="Объект 2"/>
+          <p:cNvSpPr>
+            <a:spLocks noGrp="1"/>
+          </p:cNvSpPr>
+          <p:nvPr>
+            <p:ph idx="1"/>
+          </p:nvPr>
+        </p:nvSpPr>
+        <p:spPr/>
+        <p:txBody>
+          <a:bodyPr>
+            <a:normAutofit/>
+          </a:bodyPr>
+          <a:lstStyle/>
+          <a:p>
+            <a:r>
+              <a:rPr lang="ru-RU" sz="1800" dirty="0" smtClean="0"/>
+              <a:t>Для просмотра списка модемов в группе достаточно зайти на вкладку «Список групп» и щелкнуть двойным щелчком по строчке с интересующей группой. Откроется информационное окно со списком модемов в группе.</a:t>
+            </a:r>
+            <a:endParaRPr lang="ru-RU" sz="1800" dirty="0"/>
+          </a:p>
+        </p:txBody>
+      </p:sp>
+      <p:pic>
+        <p:nvPicPr>
+          <p:cNvPr id="11266" name="Picture 2"/>
+          <p:cNvPicPr>
+            <a:picLocks noChangeAspect="1" noChangeArrowheads="1"/>
+          </p:cNvPicPr>
+          <p:nvPr/>
+        </p:nvPicPr>
+        <p:blipFill>
+          <a:blip r:embed="rId2">
+            <a:extLst>
+              <a:ext uri="{28A0092B-C50C-407E-A947-70E740481C1C}">
+                <a14:useLocalDpi xmlns:a14="http://schemas.microsoft.com/office/drawing/2010/main" val="0"/>
+              </a:ext>
+            </a:extLst>
+          </a:blip>
+          <a:srcRect/>
+          <a:stretch>
+            <a:fillRect/>
+          </a:stretch>
+        </p:blipFill>
+        <p:spPr bwMode="auto">
+          <a:xfrm>
+            <a:off x="31998" y="3364285"/>
+            <a:ext cx="9112001" cy="3493715"/>
+          </a:xfrm>
+          <a:prstGeom prst="rect">
+            <a:avLst/>
+          </a:prstGeom>
+          <a:noFill/>
+          <a:ln>
+            <a:noFill/>
+          </a:ln>
+          <a:effectLst/>
+          <a:extLst>
+            <a:ext uri="{909E8E84-426E-40DD-AFC4-6F175D3DCCD1}">
+              <a14:hiddenFill xmlns:a14="http://schemas.microsoft.com/office/drawing/2010/main">
+                <a:solidFill>
+                  <a:schemeClr val="accent1"/>
+                </a:solidFill>
+              </a14:hiddenFill>
+            </a:ext>
+            <a:ext uri="{91240B29-F687-4F45-9708-019B960494DF}">
+              <a14:hiddenLine xmlns:a14="http://schemas.microsoft.com/office/drawing/2010/main" w="9525">
+                <a:solidFill>
+                  <a:schemeClr val="tx1"/>
+                </a:solidFill>
+                <a:miter lim="800000"/>
+                <a:headEnd/>
+                <a:tailEnd/>
+              </a14:hiddenLine>
+            </a:ext>
+            <a:ext uri="{AF507438-7753-43E0-B8FC-AC1667EBCBE1}">
+              <a14:hiddenEffects xmlns:a14="http://schemas.microsoft.com/office/drawing/2010/main">
+                <a:effectLst>
+                  <a:outerShdw dist="35921" dir="2700000" algn="ctr" rotWithShape="0">
+                    <a:schemeClr val="bg2"/>
+                  </a:outerShdw>
+                </a:effectLst>
+              </a14:hiddenEffects>
+            </a:ext>
+          </a:extLst>
+        </p:spPr>
+      </p:pic>
+    </p:spTree>
+    <p:extLst>
+      <p:ext uri="{BB962C8B-B14F-4D97-AF65-F5344CB8AC3E}">
+        <p14:creationId xmlns:p14="http://schemas.microsoft.com/office/powerpoint/2010/main" val="895105103"/>
+      </p:ext>
+    </p:extLst>
+  </p:cSld>
+  <p:clrMapOvr>
+    <a:masterClrMapping/>
+  </p:clrMapOvr>
+</p:sld>
+</file>
+
+<file path=ppt/slides/slide27.xml><?xml version="1.0" encoding="utf-8"?>
+<p:sld xmlns:a="http://schemas.openxmlformats.org/drawingml/2006/main" xmlns:r="http://schemas.openxmlformats.org/officeDocument/2006/relationships" xmlns:p="http://schemas.openxmlformats.org/presentationml/2006/main">
+  <p:cSld>
+    <p:spTree>
+      <p:nvGrpSpPr>
+        <p:cNvPr id="1" name=""/>
+        <p:cNvGrpSpPr/>
+        <p:nvPr/>
+      </p:nvGrpSpPr>
+      <p:grpSpPr>
+        <a:xfrm>
+          <a:off x="0" y="0"/>
+          <a:ext cx="0" cy="0"/>
+          <a:chOff x="0" y="0"/>
+          <a:chExt cx="0" cy="0"/>
+        </a:xfrm>
+      </p:grpSpPr>
+      <p:sp>
+        <p:nvSpPr>
+          <p:cNvPr id="2" name="Заголовок 1"/>
+          <p:cNvSpPr>
+            <a:spLocks noGrp="1"/>
+          </p:cNvSpPr>
+          <p:nvPr>
+            <p:ph type="title"/>
+          </p:nvPr>
+        </p:nvSpPr>
+        <p:spPr/>
+        <p:txBody>
+          <a:bodyPr>
+            <a:normAutofit fontScale="90000"/>
+          </a:bodyPr>
+          <a:lstStyle/>
+          <a:p>
+            <a:r>
+              <a:rPr lang="ru-RU" dirty="0" smtClean="0"/>
+              <a:t>Просмотр всех </a:t>
+            </a:r>
+            <a:r>
+              <a:rPr lang="en-US" dirty="0" smtClean="0"/>
+              <a:t>SMS</a:t>
+            </a:r>
+            <a:r>
+              <a:rPr lang="ru-RU" dirty="0" smtClean="0"/>
+              <a:t> сообщений, пришедших в систему</a:t>
+            </a:r>
+            <a:endParaRPr lang="ru-RU" dirty="0"/>
+          </a:p>
+        </p:txBody>
+      </p:sp>
+      <p:pic>
+        <p:nvPicPr>
+          <p:cNvPr id="12290" name="Picture 2"/>
+          <p:cNvPicPr>
+            <a:picLocks noChangeAspect="1" noChangeArrowheads="1"/>
+          </p:cNvPicPr>
+          <p:nvPr/>
+        </p:nvPicPr>
+        <p:blipFill>
+          <a:blip r:embed="rId2">
+            <a:extLst>
+              <a:ext uri="{28A0092B-C50C-407E-A947-70E740481C1C}">
+                <a14:useLocalDpi xmlns:a14="http://schemas.microsoft.com/office/drawing/2010/main" val="0"/>
+              </a:ext>
+            </a:extLst>
+          </a:blip>
+          <a:srcRect/>
+          <a:stretch>
+            <a:fillRect/>
+          </a:stretch>
+        </p:blipFill>
+        <p:spPr bwMode="auto">
+          <a:xfrm>
+            <a:off x="27012" y="1604646"/>
+            <a:ext cx="9116987" cy="5253353"/>
+          </a:xfrm>
+          <a:prstGeom prst="rect">
+            <a:avLst/>
+          </a:prstGeom>
+          <a:noFill/>
+          <a:ln>
+            <a:noFill/>
+          </a:ln>
+          <a:effectLst/>
+          <a:extLst>
+            <a:ext uri="{909E8E84-426E-40DD-AFC4-6F175D3DCCD1}">
+              <a14:hiddenFill xmlns:a14="http://schemas.microsoft.com/office/drawing/2010/main">
+                <a:solidFill>
+                  <a:schemeClr val="accent1"/>
+                </a:solidFill>
+              </a14:hiddenFill>
+            </a:ext>
+            <a:ext uri="{91240B29-F687-4F45-9708-019B960494DF}">
+              <a14:hiddenLine xmlns:a14="http://schemas.microsoft.com/office/drawing/2010/main" w="9525">
+                <a:solidFill>
+                  <a:schemeClr val="tx1"/>
+                </a:solidFill>
+                <a:miter lim="800000"/>
+                <a:headEnd/>
+                <a:tailEnd/>
+              </a14:hiddenLine>
+            </a:ext>
+            <a:ext uri="{AF507438-7753-43E0-B8FC-AC1667EBCBE1}">
+              <a14:hiddenEffects xmlns:a14="http://schemas.microsoft.com/office/drawing/2010/main">
+                <a:effectLst>
+                  <a:outerShdw dist="35921" dir="2700000" algn="ctr" rotWithShape="0">
+                    <a:schemeClr val="bg2"/>
+                  </a:outerShdw>
+                </a:effectLst>
+              </a14:hiddenEffects>
+            </a:ext>
+          </a:extLst>
+        </p:spPr>
+      </p:pic>
+    </p:spTree>
+    <p:extLst>
+      <p:ext uri="{BB962C8B-B14F-4D97-AF65-F5344CB8AC3E}">
+        <p14:creationId xmlns:p14="http://schemas.microsoft.com/office/powerpoint/2010/main" val="2389091266"/>
       </p:ext>
     </p:extLst>
   </p:cSld>
@@ -14190,7 +17901,9 @@
         </p:nvSpPr>
         <p:spPr/>
         <p:txBody>
-          <a:bodyPr/>
+          <a:bodyPr>
+            <a:normAutofit fontScale="92500"/>
+          </a:bodyPr>
           <a:lstStyle/>
           <a:p>
             <a:r>
@@ -14211,11 +17924,46 @@
             </a:r>
             <a:r>
               <a:rPr lang="ru-RU" dirty="0" smtClean="0"/>
-              <a:t> порта у модема. </a:t>
-            </a:r>
-            <a:r>
-              <a:rPr lang="ru-RU" smtClean="0"/>
-              <a:t>()</a:t>
+              <a:t> </a:t>
+            </a:r>
+            <a:r>
+              <a:rPr lang="ru-RU" dirty="0" smtClean="0"/>
+              <a:t>порта </a:t>
+            </a:r>
+            <a:r>
+              <a:rPr lang="ru-RU" dirty="0" smtClean="0"/>
+              <a:t>у модема. </a:t>
+            </a:r>
+            <a:r>
+              <a:rPr lang="ru-RU" dirty="0" smtClean="0"/>
+              <a:t>(совпадает ли номер </a:t>
+            </a:r>
+            <a:r>
+              <a:rPr lang="en-US" dirty="0" smtClean="0"/>
+              <a:t>COM</a:t>
+            </a:r>
+            <a:r>
+              <a:rPr lang="ru-RU" dirty="0" smtClean="0"/>
+              <a:t>-порта</a:t>
+            </a:r>
+            <a:r>
+              <a:rPr lang="ru-RU" dirty="0" smtClean="0"/>
+              <a:t>).</a:t>
+            </a:r>
+            <a:endParaRPr lang="en-US" dirty="0" smtClean="0"/>
+          </a:p>
+          <a:p>
+            <a:r>
+              <a:rPr lang="ru-RU" dirty="0" smtClean="0"/>
+              <a:t>Держать включенным </a:t>
+            </a:r>
+            <a:r>
+              <a:rPr lang="en-US" dirty="0" smtClean="0"/>
+              <a:t>SMS Daemon.bat</a:t>
+            </a:r>
+            <a:r>
+              <a:rPr lang="ru-RU" dirty="0" smtClean="0"/>
+              <a:t> (если закрыть приложение – отправка по расписанию перестанет работать)</a:t>
             </a:r>
             <a:endParaRPr lang="ru-RU" dirty="0"/>
           </a:p>
@@ -14225,6 +17973,681 @@
     <p:extLst>
       <p:ext uri="{BB962C8B-B14F-4D97-AF65-F5344CB8AC3E}">
         <p14:creationId xmlns:p14="http://schemas.microsoft.com/office/powerpoint/2010/main" val="183687753"/>
+      </p:ext>
+    </p:extLst>
+  </p:cSld>
+  <p:clrMapOvr>
+    <a:masterClrMapping/>
+  </p:clrMapOvr>
+</p:sld>
+</file>
+
+<file path=ppt/slides/slide7.xml><?xml version="1.0" encoding="utf-8"?>
+<p:sld xmlns:a="http://schemas.openxmlformats.org/drawingml/2006/main" xmlns:r="http://schemas.openxmlformats.org/officeDocument/2006/relationships" xmlns:p="http://schemas.openxmlformats.org/presentationml/2006/main">
+  <p:cSld>
+    <p:spTree>
+      <p:nvGrpSpPr>
+        <p:cNvPr id="1" name=""/>
+        <p:cNvGrpSpPr/>
+        <p:nvPr/>
+      </p:nvGrpSpPr>
+      <p:grpSpPr>
+        <a:xfrm>
+          <a:off x="0" y="0"/>
+          <a:ext cx="0" cy="0"/>
+          <a:chOff x="0" y="0"/>
+          <a:chExt cx="0" cy="0"/>
+        </a:xfrm>
+      </p:grpSpPr>
+      <p:sp>
+        <p:nvSpPr>
+          <p:cNvPr id="2" name="Заголовок 1"/>
+          <p:cNvSpPr>
+            <a:spLocks noGrp="1"/>
+          </p:cNvSpPr>
+          <p:nvPr>
+            <p:ph type="title"/>
+          </p:nvPr>
+        </p:nvSpPr>
+        <p:spPr/>
+        <p:txBody>
+          <a:bodyPr/>
+          <a:lstStyle/>
+          <a:p>
+            <a:r>
+              <a:rPr lang="ru-RU" dirty="0" smtClean="0"/>
+              <a:t>Установочный пакет системы</a:t>
+            </a:r>
+            <a:endParaRPr lang="ru-RU" dirty="0"/>
+          </a:p>
+        </p:txBody>
+      </p:sp>
+      <p:sp>
+        <p:nvSpPr>
+          <p:cNvPr id="3" name="Объект 2"/>
+          <p:cNvSpPr>
+            <a:spLocks noGrp="1"/>
+          </p:cNvSpPr>
+          <p:nvPr>
+            <p:ph idx="1"/>
+          </p:nvPr>
+        </p:nvSpPr>
+        <p:spPr/>
+        <p:txBody>
+          <a:bodyPr>
+            <a:normAutofit fontScale="70000" lnSpcReduction="20000"/>
+          </a:bodyPr>
+          <a:lstStyle/>
+          <a:p>
+            <a:pPr marL="0" indent="0">
+              <a:buNone/>
+            </a:pPr>
+            <a:r>
+              <a:rPr lang="ru-RU" dirty="0"/>
+              <a:t>В</a:t>
+            </a:r>
+            <a:r>
+              <a:rPr lang="ru-RU" dirty="0" smtClean="0"/>
+              <a:t> установочный пакет системы входят:</a:t>
+            </a:r>
+          </a:p>
+          <a:p>
+            <a:pPr marL="514350" indent="-514350">
+              <a:buAutoNum type="arabicParenR"/>
+            </a:pPr>
+            <a:r>
+              <a:rPr lang="ru-RU" dirty="0" smtClean="0"/>
+              <a:t>Архив с кодами программы и демона </a:t>
+            </a:r>
+            <a:r>
+              <a:rPr lang="en-US" dirty="0" smtClean="0"/>
+              <a:t>SMS Daemon</a:t>
+            </a:r>
+            <a:r>
+              <a:rPr lang="ru-RU" dirty="0" smtClean="0"/>
+              <a:t> (</a:t>
+            </a:r>
+            <a:r>
+              <a:rPr lang="en-US" dirty="0" err="1" smtClean="0"/>
+              <a:t>symfony.rar</a:t>
+            </a:r>
+            <a:r>
+              <a:rPr lang="ru-RU" dirty="0" smtClean="0"/>
+              <a:t>).</a:t>
+            </a:r>
+          </a:p>
+          <a:p>
+            <a:pPr marL="514350" indent="-514350">
+              <a:buAutoNum type="arabicParenR"/>
+            </a:pPr>
+            <a:r>
+              <a:rPr lang="ru-RU" dirty="0" smtClean="0"/>
+              <a:t>Бесплатный пакет веб-сервера </a:t>
+            </a:r>
+            <a:r>
+              <a:rPr lang="en-US" dirty="0" smtClean="0"/>
+              <a:t>PHP-Apache</a:t>
+            </a:r>
+            <a:r>
+              <a:rPr lang="ru-RU" dirty="0" smtClean="0"/>
+              <a:t>-</a:t>
+            </a:r>
+            <a:r>
+              <a:rPr lang="en-US" dirty="0" smtClean="0"/>
+              <a:t>MySQL (</a:t>
+            </a:r>
+            <a:r>
+              <a:rPr lang="en-US" dirty="0" err="1" smtClean="0"/>
+              <a:t>xampp</a:t>
+            </a:r>
+            <a:r>
+              <a:rPr lang="en-US" dirty="0" smtClean="0"/>
+              <a:t>)</a:t>
+            </a:r>
+            <a:r>
+              <a:rPr lang="ru-RU" dirty="0" smtClean="0"/>
+              <a:t>.</a:t>
+            </a:r>
+          </a:p>
+          <a:p>
+            <a:pPr marL="514350" indent="-514350">
+              <a:buAutoNum type="arabicParenR"/>
+            </a:pPr>
+            <a:r>
+              <a:rPr lang="ru-RU" dirty="0" smtClean="0"/>
+              <a:t>Дистрибутивы демона </a:t>
+            </a:r>
+            <a:r>
+              <a:rPr lang="en-US" dirty="0" err="1" smtClean="0"/>
+              <a:t>Gammu-smsd</a:t>
+            </a:r>
+            <a:r>
+              <a:rPr lang="ru-RU" dirty="0" smtClean="0"/>
+              <a:t> для </a:t>
+            </a:r>
+            <a:r>
+              <a:rPr lang="en-US" dirty="0" smtClean="0"/>
+              <a:t>Windows.</a:t>
+            </a:r>
+            <a:endParaRPr lang="ru-RU" dirty="0" smtClean="0"/>
+          </a:p>
+          <a:p>
+            <a:pPr marL="514350" indent="-514350">
+              <a:buAutoNum type="arabicParenR"/>
+            </a:pPr>
+            <a:r>
+              <a:rPr lang="ru-RU" dirty="0" smtClean="0"/>
+              <a:t>Дистрибутив </a:t>
+            </a:r>
+            <a:r>
+              <a:rPr lang="en-US" dirty="0" smtClean="0"/>
+              <a:t>Heidi-SQL </a:t>
+            </a:r>
+            <a:r>
+              <a:rPr lang="ru-RU" dirty="0" smtClean="0"/>
+              <a:t>для </a:t>
+            </a:r>
+            <a:r>
+              <a:rPr lang="en-US" dirty="0" smtClean="0"/>
+              <a:t>windows (</a:t>
+            </a:r>
+            <a:r>
+              <a:rPr lang="ru-RU" dirty="0" smtClean="0"/>
+              <a:t>удобный просмотр и редактирование БД в процессе эксплуатации, установка не обязательна</a:t>
+            </a:r>
+            <a:r>
+              <a:rPr lang="en-US" dirty="0" smtClean="0"/>
+              <a:t>)</a:t>
+            </a:r>
+            <a:r>
+              <a:rPr lang="ru-RU" dirty="0" smtClean="0"/>
+              <a:t>.</a:t>
+            </a:r>
+            <a:endParaRPr lang="en-US" dirty="0" smtClean="0"/>
+          </a:p>
+          <a:p>
+            <a:pPr marL="514350" indent="-514350">
+              <a:buAutoNum type="arabicParenR"/>
+            </a:pPr>
+            <a:r>
+              <a:rPr lang="en-US" dirty="0" err="1" smtClean="0"/>
+              <a:t>Git</a:t>
+            </a:r>
+            <a:r>
+              <a:rPr lang="en-US" dirty="0" smtClean="0"/>
+              <a:t>-hub</a:t>
+            </a:r>
+            <a:r>
+              <a:rPr lang="ru-RU" dirty="0" smtClean="0"/>
+              <a:t> – система контроля версии. (Установка требуется в случае когда с заказчиком согласованы дальнейшие разработки системы для автоматического обновления ПО через интернет, для текущей эксплуатации </a:t>
+            </a:r>
+            <a:r>
+              <a:rPr lang="en-US" dirty="0" err="1" smtClean="0"/>
+              <a:t>git</a:t>
+            </a:r>
+            <a:r>
+              <a:rPr lang="en-US" dirty="0" smtClean="0"/>
+              <a:t>-hub </a:t>
+            </a:r>
+            <a:r>
+              <a:rPr lang="ru-RU" dirty="0" smtClean="0"/>
+              <a:t>не обязателен к установке).</a:t>
+            </a:r>
+            <a:endParaRPr lang="ru-RU" dirty="0"/>
+          </a:p>
+        </p:txBody>
+      </p:sp>
+    </p:spTree>
+    <p:extLst>
+      <p:ext uri="{BB962C8B-B14F-4D97-AF65-F5344CB8AC3E}">
+        <p14:creationId xmlns:p14="http://schemas.microsoft.com/office/powerpoint/2010/main" val="976634071"/>
+      </p:ext>
+    </p:extLst>
+  </p:cSld>
+  <p:clrMapOvr>
+    <a:masterClrMapping/>
+  </p:clrMapOvr>
+</p:sld>
+</file>
+
+<file path=ppt/slides/slide8.xml><?xml version="1.0" encoding="utf-8"?>
+<p:sld xmlns:a="http://schemas.openxmlformats.org/drawingml/2006/main" xmlns:r="http://schemas.openxmlformats.org/officeDocument/2006/relationships" xmlns:p="http://schemas.openxmlformats.org/presentationml/2006/main">
+  <p:cSld>
+    <p:spTree>
+      <p:nvGrpSpPr>
+        <p:cNvPr id="1" name=""/>
+        <p:cNvGrpSpPr/>
+        <p:nvPr/>
+      </p:nvGrpSpPr>
+      <p:grpSpPr>
+        <a:xfrm>
+          <a:off x="0" y="0"/>
+          <a:ext cx="0" cy="0"/>
+          <a:chOff x="0" y="0"/>
+          <a:chExt cx="0" cy="0"/>
+        </a:xfrm>
+      </p:grpSpPr>
+      <p:sp>
+        <p:nvSpPr>
+          <p:cNvPr id="2" name="Заголовок 1"/>
+          <p:cNvSpPr>
+            <a:spLocks noGrp="1"/>
+          </p:cNvSpPr>
+          <p:nvPr>
+            <p:ph type="title"/>
+          </p:nvPr>
+        </p:nvSpPr>
+        <p:spPr/>
+        <p:txBody>
+          <a:bodyPr/>
+          <a:lstStyle/>
+          <a:p>
+            <a:r>
+              <a:rPr lang="ru-RU" dirty="0" smtClean="0"/>
+              <a:t>Порядок установки системы</a:t>
+            </a:r>
+            <a:endParaRPr lang="ru-RU" dirty="0"/>
+          </a:p>
+        </p:txBody>
+      </p:sp>
+      <p:sp>
+        <p:nvSpPr>
+          <p:cNvPr id="3" name="Объект 2"/>
+          <p:cNvSpPr>
+            <a:spLocks noGrp="1"/>
+          </p:cNvSpPr>
+          <p:nvPr>
+            <p:ph idx="1"/>
+          </p:nvPr>
+        </p:nvSpPr>
+        <p:spPr/>
+        <p:txBody>
+          <a:bodyPr>
+            <a:normAutofit fontScale="85000" lnSpcReduction="20000"/>
+          </a:bodyPr>
+          <a:lstStyle/>
+          <a:p>
+            <a:r>
+              <a:rPr lang="ru-RU" dirty="0" smtClean="0"/>
+              <a:t>Установить </a:t>
+            </a:r>
+            <a:r>
+              <a:rPr lang="en-US" dirty="0" smtClean="0"/>
+              <a:t>web-server </a:t>
+            </a:r>
+            <a:r>
+              <a:rPr lang="ru-RU" dirty="0" smtClean="0"/>
+              <a:t>и </a:t>
+            </a:r>
+            <a:r>
+              <a:rPr lang="en-US" dirty="0" err="1" smtClean="0"/>
+              <a:t>mysql</a:t>
+            </a:r>
+            <a:r>
+              <a:rPr lang="ru-RU" dirty="0" smtClean="0"/>
+              <a:t> сервер из пакета </a:t>
+            </a:r>
+            <a:r>
+              <a:rPr lang="en-US" dirty="0" err="1" smtClean="0"/>
+              <a:t>xampp</a:t>
+            </a:r>
+            <a:r>
+              <a:rPr lang="ru-RU" dirty="0" smtClean="0"/>
+              <a:t>.</a:t>
+            </a:r>
+          </a:p>
+          <a:p>
+            <a:r>
+              <a:rPr lang="ru-RU" dirty="0" smtClean="0"/>
+              <a:t>Установить </a:t>
+            </a:r>
+            <a:r>
+              <a:rPr lang="en-US" dirty="0" err="1" smtClean="0"/>
+              <a:t>HeidiSQL</a:t>
+            </a:r>
+            <a:r>
+              <a:rPr lang="ru-RU" dirty="0" smtClean="0"/>
+              <a:t> и проверить подключение к БД.</a:t>
+            </a:r>
+          </a:p>
+          <a:p>
+            <a:r>
+              <a:rPr lang="ru-RU" dirty="0" smtClean="0"/>
+              <a:t>Распаковать архив </a:t>
+            </a:r>
+            <a:r>
+              <a:rPr lang="en-US" dirty="0" err="1" smtClean="0"/>
+              <a:t>symfony.rar</a:t>
+            </a:r>
+            <a:r>
+              <a:rPr lang="en-US" dirty="0" smtClean="0"/>
+              <a:t> </a:t>
+            </a:r>
+            <a:r>
+              <a:rPr lang="ru-RU" dirty="0" smtClean="0"/>
+              <a:t>в папку </a:t>
+            </a:r>
+            <a:r>
+              <a:rPr lang="en-US" dirty="0" err="1" smtClean="0"/>
+              <a:t>xampp</a:t>
+            </a:r>
+            <a:r>
+              <a:rPr lang="en-US" dirty="0" smtClean="0"/>
+              <a:t>/</a:t>
+            </a:r>
+            <a:r>
+              <a:rPr lang="en-US" dirty="0" err="1" smtClean="0"/>
+              <a:t>htdocs</a:t>
+            </a:r>
+            <a:r>
+              <a:rPr lang="en-US" dirty="0" smtClean="0"/>
+              <a:t>/ </a:t>
+            </a:r>
+            <a:r>
+              <a:rPr lang="ru-RU" dirty="0" smtClean="0"/>
+              <a:t>(корневую директорию </a:t>
+            </a:r>
+            <a:r>
+              <a:rPr lang="en-US" dirty="0" smtClean="0"/>
+              <a:t>Web-</a:t>
+            </a:r>
+            <a:r>
+              <a:rPr lang="ru-RU" dirty="0" smtClean="0"/>
+              <a:t>сервера, чтобы путь к исходникам выглядел как</a:t>
+            </a:r>
+            <a:r>
+              <a:rPr lang="en-US" dirty="0" smtClean="0"/>
+              <a:t> </a:t>
+            </a:r>
+            <a:r>
+              <a:rPr lang="ru-RU" dirty="0" smtClean="0"/>
+              <a:t>например </a:t>
+            </a:r>
+            <a:r>
+              <a:rPr lang="en-US" dirty="0" smtClean="0"/>
+              <a:t>c:/xampp/htdocs/symfony/</a:t>
+            </a:r>
+            <a:r>
+              <a:rPr lang="ru-RU" dirty="0" smtClean="0"/>
+              <a:t>) </a:t>
+            </a:r>
+          </a:p>
+          <a:p>
+            <a:r>
+              <a:rPr lang="ru-RU" dirty="0" smtClean="0"/>
+              <a:t>Установить </a:t>
+            </a:r>
+            <a:r>
+              <a:rPr lang="en-US" dirty="0" err="1" smtClean="0"/>
+              <a:t>Gammu-smsd</a:t>
+            </a:r>
+            <a:r>
+              <a:rPr lang="en-US" dirty="0" smtClean="0"/>
+              <a:t>.</a:t>
+            </a:r>
+            <a:endParaRPr lang="ru-RU" dirty="0" smtClean="0"/>
+          </a:p>
+          <a:p>
+            <a:r>
+              <a:rPr lang="ru-RU" dirty="0" smtClean="0"/>
+              <a:t>Подключить к компьютеру </a:t>
+            </a:r>
+            <a:r>
+              <a:rPr lang="en-US" dirty="0" smtClean="0"/>
+              <a:t>3G </a:t>
+            </a:r>
+            <a:r>
+              <a:rPr lang="ru-RU" dirty="0" smtClean="0"/>
+              <a:t>модем</a:t>
+            </a:r>
+          </a:p>
+          <a:p>
+            <a:r>
+              <a:rPr lang="ru-RU" dirty="0" smtClean="0"/>
+              <a:t>Произвести настройку системы согласно следующим слайдам.</a:t>
+            </a:r>
+          </a:p>
+          <a:p>
+            <a:endParaRPr lang="ru-RU" dirty="0"/>
+          </a:p>
+        </p:txBody>
+      </p:sp>
+    </p:spTree>
+    <p:extLst>
+      <p:ext uri="{BB962C8B-B14F-4D97-AF65-F5344CB8AC3E}">
+        <p14:creationId xmlns:p14="http://schemas.microsoft.com/office/powerpoint/2010/main" val="3571178345"/>
+      </p:ext>
+    </p:extLst>
+  </p:cSld>
+  <p:clrMapOvr>
+    <a:masterClrMapping/>
+  </p:clrMapOvr>
+</p:sld>
+</file>
+
+<file path=ppt/slides/slide9.xml><?xml version="1.0" encoding="utf-8"?>
+<p:sld xmlns:a="http://schemas.openxmlformats.org/drawingml/2006/main" xmlns:r="http://schemas.openxmlformats.org/officeDocument/2006/relationships" xmlns:p="http://schemas.openxmlformats.org/presentationml/2006/main">
+  <p:cSld>
+    <p:spTree>
+      <p:nvGrpSpPr>
+        <p:cNvPr id="1" name=""/>
+        <p:cNvGrpSpPr/>
+        <p:nvPr/>
+      </p:nvGrpSpPr>
+      <p:grpSpPr>
+        <a:xfrm>
+          <a:off x="0" y="0"/>
+          <a:ext cx="0" cy="0"/>
+          <a:chOff x="0" y="0"/>
+          <a:chExt cx="0" cy="0"/>
+        </a:xfrm>
+      </p:grpSpPr>
+      <p:sp>
+        <p:nvSpPr>
+          <p:cNvPr id="2" name="Заголовок 1"/>
+          <p:cNvSpPr>
+            <a:spLocks noGrp="1"/>
+          </p:cNvSpPr>
+          <p:nvPr>
+            <p:ph type="title"/>
+          </p:nvPr>
+        </p:nvSpPr>
+        <p:spPr/>
+        <p:txBody>
+          <a:bodyPr/>
+          <a:lstStyle/>
+          <a:p>
+            <a:r>
+              <a:rPr lang="ru-RU" dirty="0" smtClean="0"/>
+              <a:t>Настройка демона </a:t>
+            </a:r>
+            <a:r>
+              <a:rPr lang="en-US" dirty="0" err="1" smtClean="0"/>
+              <a:t>Gammu-smsd</a:t>
+            </a:r>
+            <a:endParaRPr lang="ru-RU" dirty="0"/>
+          </a:p>
+        </p:txBody>
+      </p:sp>
+      <p:sp>
+        <p:nvSpPr>
+          <p:cNvPr id="3" name="Объект 2"/>
+          <p:cNvSpPr>
+            <a:spLocks noGrp="1"/>
+          </p:cNvSpPr>
+          <p:nvPr>
+            <p:ph idx="1"/>
+          </p:nvPr>
+        </p:nvSpPr>
+        <p:spPr/>
+        <p:txBody>
+          <a:bodyPr/>
+          <a:lstStyle/>
+          <a:p>
+            <a:r>
+              <a:rPr lang="ru-RU" dirty="0" smtClean="0"/>
+              <a:t>Посмотреть на каком </a:t>
+            </a:r>
+            <a:r>
+              <a:rPr lang="en-US" dirty="0" smtClean="0"/>
+              <a:t>COM</a:t>
+            </a:r>
+            <a:r>
+              <a:rPr lang="ru-RU" dirty="0" smtClean="0"/>
+              <a:t> порту установлен 3</a:t>
+            </a:r>
+            <a:r>
+              <a:rPr lang="en-US" dirty="0" smtClean="0"/>
+              <a:t>G </a:t>
+            </a:r>
+            <a:r>
+              <a:rPr lang="ru-RU" dirty="0" smtClean="0"/>
+              <a:t>модем. (в примере снизу порт </a:t>
+            </a:r>
+            <a:r>
+              <a:rPr lang="en-US" dirty="0" smtClean="0"/>
+              <a:t>COM8</a:t>
+            </a:r>
+            <a:r>
+              <a:rPr lang="ru-RU" dirty="0" smtClean="0"/>
+              <a:t>).</a:t>
+            </a:r>
+            <a:endParaRPr lang="ru-RU" dirty="0"/>
+          </a:p>
+        </p:txBody>
+      </p:sp>
+      <p:pic>
+        <p:nvPicPr>
+          <p:cNvPr id="1027" name="Picture 3"/>
+          <p:cNvPicPr>
+            <a:picLocks noChangeAspect="1" noChangeArrowheads="1"/>
+          </p:cNvPicPr>
+          <p:nvPr/>
+        </p:nvPicPr>
+        <p:blipFill>
+          <a:blip r:embed="rId2">
+            <a:extLst>
+              <a:ext uri="{28A0092B-C50C-407E-A947-70E740481C1C}">
+                <a14:useLocalDpi xmlns:a14="http://schemas.microsoft.com/office/drawing/2010/main" val="0"/>
+              </a:ext>
+            </a:extLst>
+          </a:blip>
+          <a:srcRect/>
+          <a:stretch>
+            <a:fillRect/>
+          </a:stretch>
+        </p:blipFill>
+        <p:spPr bwMode="auto">
+          <a:xfrm>
+            <a:off x="323528" y="3212976"/>
+            <a:ext cx="4005505" cy="3313956"/>
+          </a:xfrm>
+          <a:prstGeom prst="rect">
+            <a:avLst/>
+          </a:prstGeom>
+          <a:noFill/>
+          <a:ln>
+            <a:noFill/>
+          </a:ln>
+          <a:effectLst/>
+          <a:extLst>
+            <a:ext uri="{909E8E84-426E-40DD-AFC4-6F175D3DCCD1}">
+              <a14:hiddenFill xmlns:a14="http://schemas.microsoft.com/office/drawing/2010/main">
+                <a:solidFill>
+                  <a:schemeClr val="accent1"/>
+                </a:solidFill>
+              </a14:hiddenFill>
+            </a:ext>
+            <a:ext uri="{91240B29-F687-4F45-9708-019B960494DF}">
+              <a14:hiddenLine xmlns:a14="http://schemas.microsoft.com/office/drawing/2010/main" w="9525">
+                <a:solidFill>
+                  <a:schemeClr val="tx1"/>
+                </a:solidFill>
+                <a:miter lim="800000"/>
+                <a:headEnd/>
+                <a:tailEnd/>
+              </a14:hiddenLine>
+            </a:ext>
+            <a:ext uri="{AF507438-7753-43E0-B8FC-AC1667EBCBE1}">
+              <a14:hiddenEffects xmlns:a14="http://schemas.microsoft.com/office/drawing/2010/main">
+                <a:effectLst>
+                  <a:outerShdw dist="35921" dir="2700000" algn="ctr" rotWithShape="0">
+                    <a:schemeClr val="bg2"/>
+                  </a:outerShdw>
+                </a:effectLst>
+              </a14:hiddenEffects>
+            </a:ext>
+          </a:extLst>
+        </p:spPr>
+      </p:pic>
+      <p:pic>
+        <p:nvPicPr>
+          <p:cNvPr id="1028" name="Picture 4"/>
+          <p:cNvPicPr>
+            <a:picLocks noChangeAspect="1" noChangeArrowheads="1"/>
+          </p:cNvPicPr>
+          <p:nvPr/>
+        </p:nvPicPr>
+        <p:blipFill>
+          <a:blip r:embed="rId3">
+            <a:extLst>
+              <a:ext uri="{28A0092B-C50C-407E-A947-70E740481C1C}">
+                <a14:useLocalDpi xmlns:a14="http://schemas.microsoft.com/office/drawing/2010/main" val="0"/>
+              </a:ext>
+            </a:extLst>
+          </a:blip>
+          <a:srcRect/>
+          <a:stretch>
+            <a:fillRect/>
+          </a:stretch>
+        </p:blipFill>
+        <p:spPr bwMode="auto">
+          <a:xfrm>
+            <a:off x="4499992" y="3212976"/>
+            <a:ext cx="4032448" cy="3328264"/>
+          </a:xfrm>
+          <a:prstGeom prst="rect">
+            <a:avLst/>
+          </a:prstGeom>
+          <a:noFill/>
+          <a:ln>
+            <a:noFill/>
+          </a:ln>
+          <a:effectLst/>
+          <a:extLst>
+            <a:ext uri="{909E8E84-426E-40DD-AFC4-6F175D3DCCD1}">
+              <a14:hiddenFill xmlns:a14="http://schemas.microsoft.com/office/drawing/2010/main">
+                <a:solidFill>
+                  <a:schemeClr val="accent1"/>
+                </a:solidFill>
+              </a14:hiddenFill>
+            </a:ext>
+            <a:ext uri="{91240B29-F687-4F45-9708-019B960494DF}">
+              <a14:hiddenLine xmlns:a14="http://schemas.microsoft.com/office/drawing/2010/main" w="9525">
+                <a:solidFill>
+                  <a:schemeClr val="tx1"/>
+                </a:solidFill>
+                <a:miter lim="800000"/>
+                <a:headEnd/>
+                <a:tailEnd/>
+              </a14:hiddenLine>
+            </a:ext>
+            <a:ext uri="{AF507438-7753-43E0-B8FC-AC1667EBCBE1}">
+              <a14:hiddenEffects xmlns:a14="http://schemas.microsoft.com/office/drawing/2010/main">
+                <a:effectLst>
+                  <a:outerShdw dist="35921" dir="2700000" algn="ctr" rotWithShape="0">
+                    <a:schemeClr val="bg2"/>
+                  </a:outerShdw>
+                </a:effectLst>
+              </a14:hiddenEffects>
+            </a:ext>
+          </a:extLst>
+        </p:spPr>
+      </p:pic>
+    </p:spTree>
+    <p:extLst>
+      <p:ext uri="{BB962C8B-B14F-4D97-AF65-F5344CB8AC3E}">
+        <p14:creationId xmlns:p14="http://schemas.microsoft.com/office/powerpoint/2010/main" val="2420172201"/>
       </p:ext>
     </p:extLst>
   </p:cSld>

</xml_diff>